<commit_message>
Add creation process on dataset spanis_medica_llm from hugginface datasets catemist and cares
</commit_message>
<xml_diff>
--- a/documentation/SpanishMedicaLLM.pptx
+++ b/documentation/SpanishMedicaLLM.pptx
@@ -9,14 +9,16 @@
     <p:sldId id="257" r:id="rId3"/>
     <p:sldId id="268" r:id="rId4"/>
     <p:sldId id="258" r:id="rId5"/>
-    <p:sldId id="259" r:id="rId6"/>
-    <p:sldId id="260" r:id="rId7"/>
-    <p:sldId id="265" r:id="rId8"/>
-    <p:sldId id="264" r:id="rId9"/>
-    <p:sldId id="261" r:id="rId10"/>
-    <p:sldId id="266" r:id="rId11"/>
-    <p:sldId id="262" r:id="rId12"/>
-    <p:sldId id="267" r:id="rId13"/>
+    <p:sldId id="271" r:id="rId6"/>
+    <p:sldId id="259" r:id="rId7"/>
+    <p:sldId id="260" r:id="rId8"/>
+    <p:sldId id="265" r:id="rId9"/>
+    <p:sldId id="264" r:id="rId10"/>
+    <p:sldId id="270" r:id="rId11"/>
+    <p:sldId id="261" r:id="rId12"/>
+    <p:sldId id="269" r:id="rId13"/>
+    <p:sldId id="262" r:id="rId14"/>
+    <p:sldId id="267" r:id="rId15"/>
   </p:sldIdLst>
   <p:sldSz cx="12192000" cy="6858000"/>
   <p:notesSz cx="6858000" cy="9144000"/>
@@ -272,7 +274,7 @@
           <a:p>
             <a:fld id="{BE965B01-A514-4176-8242-ABBF95CAD36E}" type="datetimeFigureOut">
               <a:rPr lang="en-US" smtClean="0"/>
-              <a:t>3/16/2024</a:t>
+              <a:t>3/18/2024</a:t>
             </a:fld>
             <a:endParaRPr lang="en-US"/>
           </a:p>
@@ -472,7 +474,7 @@
           <a:p>
             <a:fld id="{BE965B01-A514-4176-8242-ABBF95CAD36E}" type="datetimeFigureOut">
               <a:rPr lang="en-US" smtClean="0"/>
-              <a:t>3/16/2024</a:t>
+              <a:t>3/18/2024</a:t>
             </a:fld>
             <a:endParaRPr lang="en-US"/>
           </a:p>
@@ -682,7 +684,7 @@
           <a:p>
             <a:fld id="{BE965B01-A514-4176-8242-ABBF95CAD36E}" type="datetimeFigureOut">
               <a:rPr lang="en-US" smtClean="0"/>
-              <a:t>3/16/2024</a:t>
+              <a:t>3/18/2024</a:t>
             </a:fld>
             <a:endParaRPr lang="en-US"/>
           </a:p>
@@ -882,7 +884,7 @@
           <a:p>
             <a:fld id="{BE965B01-A514-4176-8242-ABBF95CAD36E}" type="datetimeFigureOut">
               <a:rPr lang="en-US" smtClean="0"/>
-              <a:t>3/16/2024</a:t>
+              <a:t>3/18/2024</a:t>
             </a:fld>
             <a:endParaRPr lang="en-US"/>
           </a:p>
@@ -1158,7 +1160,7 @@
           <a:p>
             <a:fld id="{BE965B01-A514-4176-8242-ABBF95CAD36E}" type="datetimeFigureOut">
               <a:rPr lang="en-US" smtClean="0"/>
-              <a:t>3/16/2024</a:t>
+              <a:t>3/18/2024</a:t>
             </a:fld>
             <a:endParaRPr lang="en-US"/>
           </a:p>
@@ -1426,7 +1428,7 @@
           <a:p>
             <a:fld id="{BE965B01-A514-4176-8242-ABBF95CAD36E}" type="datetimeFigureOut">
               <a:rPr lang="en-US" smtClean="0"/>
-              <a:t>3/16/2024</a:t>
+              <a:t>3/18/2024</a:t>
             </a:fld>
             <a:endParaRPr lang="en-US"/>
           </a:p>
@@ -1841,7 +1843,7 @@
           <a:p>
             <a:fld id="{BE965B01-A514-4176-8242-ABBF95CAD36E}" type="datetimeFigureOut">
               <a:rPr lang="en-US" smtClean="0"/>
-              <a:t>3/16/2024</a:t>
+              <a:t>3/18/2024</a:t>
             </a:fld>
             <a:endParaRPr lang="en-US"/>
           </a:p>
@@ -1983,7 +1985,7 @@
           <a:p>
             <a:fld id="{BE965B01-A514-4176-8242-ABBF95CAD36E}" type="datetimeFigureOut">
               <a:rPr lang="en-US" smtClean="0"/>
-              <a:t>3/16/2024</a:t>
+              <a:t>3/18/2024</a:t>
             </a:fld>
             <a:endParaRPr lang="en-US"/>
           </a:p>
@@ -2096,7 +2098,7 @@
           <a:p>
             <a:fld id="{BE965B01-A514-4176-8242-ABBF95CAD36E}" type="datetimeFigureOut">
               <a:rPr lang="en-US" smtClean="0"/>
-              <a:t>3/16/2024</a:t>
+              <a:t>3/18/2024</a:t>
             </a:fld>
             <a:endParaRPr lang="en-US"/>
           </a:p>
@@ -2409,7 +2411,7 @@
           <a:p>
             <a:fld id="{BE965B01-A514-4176-8242-ABBF95CAD36E}" type="datetimeFigureOut">
               <a:rPr lang="en-US" smtClean="0"/>
-              <a:t>3/16/2024</a:t>
+              <a:t>3/18/2024</a:t>
             </a:fld>
             <a:endParaRPr lang="en-US"/>
           </a:p>
@@ -2698,7 +2700,7 @@
           <a:p>
             <a:fld id="{BE965B01-A514-4176-8242-ABBF95CAD36E}" type="datetimeFigureOut">
               <a:rPr lang="en-US" smtClean="0"/>
-              <a:t>3/16/2024</a:t>
+              <a:t>3/18/2024</a:t>
             </a:fld>
             <a:endParaRPr lang="en-US"/>
           </a:p>
@@ -2941,7 +2943,7 @@
           <a:p>
             <a:fld id="{BE965B01-A514-4176-8242-ABBF95CAD36E}" type="datetimeFigureOut">
               <a:rPr lang="en-US" smtClean="0"/>
-              <a:t>3/16/2024</a:t>
+              <a:t>3/18/2024</a:t>
             </a:fld>
             <a:endParaRPr lang="en-US"/>
           </a:p>
@@ -3405,12 +3407,30 @@
         </p:nvSpPr>
         <p:spPr/>
         <p:txBody>
-          <a:bodyPr/>
+          <a:bodyPr>
+            <a:normAutofit lnSpcReduction="10000"/>
+          </a:bodyPr>
           <a:lstStyle/>
           <a:p>
             <a:r>
               <a:rPr lang="es-419" dirty="0"/>
-              <a:t>Un Modelo Largo de Lenguaje (LLM) para el contexto médico en idioma español</a:t>
+              <a:t>Un Modelo Grande de Lenguaje (LLM) para el contexto médico en idioma español</a:t>
+            </a:r>
+          </a:p>
+          <a:p>
+            <a:r>
+              <a:rPr lang="es-419" dirty="0" err="1"/>
+              <a:t>Hackaton</a:t>
+            </a:r>
+            <a:r>
+              <a:rPr lang="es-419" dirty="0"/>
+              <a:t> NLP 2024</a:t>
+            </a:r>
+          </a:p>
+          <a:p>
+            <a:r>
+              <a:rPr lang="es-419" dirty="0"/>
+              <a:t>Marzo 2024</a:t>
             </a:r>
             <a:endParaRPr lang="en-US" dirty="0"/>
           </a:p>
@@ -3448,28 +3468,102 @@
       </p:grpSpPr>
       <p:sp>
         <p:nvSpPr>
-          <p:cNvPr id="2" name="Título 1">
-            <a:extLst>
-              <a:ext uri="{FF2B5EF4-FFF2-40B4-BE49-F238E27FC236}">
-                <a16:creationId xmlns:a16="http://schemas.microsoft.com/office/drawing/2014/main" id="{316D1FB3-7BCD-44A2-2946-99BA1BF3C80C}"/>
-              </a:ext>
-            </a:extLst>
-          </p:cNvPr>
-          <p:cNvSpPr>
-            <a:spLocks noGrp="1"/>
-          </p:cNvSpPr>
-          <p:nvPr>
-            <p:ph type="title"/>
-          </p:nvPr>
-        </p:nvSpPr>
-        <p:spPr/>
-        <p:txBody>
-          <a:bodyPr/>
+          <p:cNvPr id="4" name="Rectángulo 3">
+            <a:extLst>
+              <a:ext uri="{FF2B5EF4-FFF2-40B4-BE49-F238E27FC236}">
+                <a16:creationId xmlns:a16="http://schemas.microsoft.com/office/drawing/2014/main" id="{AA8B3A96-54ED-61E6-F4C0-B471CF52B9FC}"/>
+              </a:ext>
+            </a:extLst>
+          </p:cNvPr>
+          <p:cNvSpPr/>
+          <p:nvPr/>
+        </p:nvSpPr>
+        <p:spPr>
+          <a:xfrm>
+            <a:off x="4486182" y="306917"/>
+            <a:ext cx="2787589" cy="1757778"/>
+          </a:xfrm>
+          <a:prstGeom prst="rect">
+            <a:avLst/>
+          </a:prstGeom>
+        </p:spPr>
+        <p:style>
+          <a:lnRef idx="2">
+            <a:schemeClr val="accent6"/>
+          </a:lnRef>
+          <a:fillRef idx="1">
+            <a:schemeClr val="lt1"/>
+          </a:fillRef>
+          <a:effectRef idx="0">
+            <a:schemeClr val="accent6"/>
+          </a:effectRef>
+          <a:fontRef idx="minor">
+            <a:schemeClr val="dk1"/>
+          </a:fontRef>
+        </p:style>
+        <p:txBody>
+          <a:bodyPr rtlCol="0" anchor="ctr"/>
           <a:lstStyle/>
           <a:p>
+            <a:pPr algn="ctr"/>
+            <a:r>
+              <a:rPr lang="es-419" b="1" dirty="0"/>
+              <a:t>Modelo LLM Base</a:t>
+            </a:r>
+          </a:p>
+          <a:p>
+            <a:pPr marL="285750" indent="-285750">
+              <a:buFont typeface="Arial" panose="020B0604020202020204" pitchFamily="34" charset="0"/>
+              <a:buChar char="•"/>
+            </a:pPr>
             <a:r>
               <a:rPr lang="es-419" dirty="0"/>
-              <a:t>Estructura del entrenador</a:t>
+              <a:t>Configuración </a:t>
+            </a:r>
+            <a:r>
+              <a:rPr lang="es-419" dirty="0" err="1"/>
+              <a:t>Qlora</a:t>
+            </a:r>
+            <a:endParaRPr lang="es-419" dirty="0"/>
+          </a:p>
+          <a:p>
+            <a:pPr marL="285750" indent="-285750">
+              <a:buFont typeface="Arial" panose="020B0604020202020204" pitchFamily="34" charset="0"/>
+              <a:buChar char="•"/>
+            </a:pPr>
+            <a:r>
+              <a:rPr lang="es-419" dirty="0"/>
+              <a:t>Salvar</a:t>
+            </a:r>
+          </a:p>
+          <a:p>
+            <a:pPr marL="285750" indent="-285750">
+              <a:buFont typeface="Arial" panose="020B0604020202020204" pitchFamily="34" charset="0"/>
+              <a:buChar char="•"/>
+            </a:pPr>
+            <a:r>
+              <a:rPr lang="es-419" dirty="0"/>
+              <a:t>Inferencia</a:t>
+            </a:r>
+          </a:p>
+          <a:p>
+            <a:pPr marL="285750" indent="-285750">
+              <a:buFont typeface="Arial" panose="020B0604020202020204" pitchFamily="34" charset="0"/>
+              <a:buChar char="•"/>
+            </a:pPr>
+            <a:r>
+              <a:rPr lang="es-419" dirty="0"/>
+              <a:t>Usar DPO</a:t>
+            </a:r>
+          </a:p>
+          <a:p>
+            <a:pPr marL="285750" indent="-285750">
+              <a:buFont typeface="Arial" panose="020B0604020202020204" pitchFamily="34" charset="0"/>
+              <a:buChar char="•"/>
+            </a:pPr>
+            <a:r>
+              <a:rPr lang="es-419" dirty="0"/>
+              <a:t>Usar Mezcla Modelos</a:t>
             </a:r>
             <a:endParaRPr lang="en-US" dirty="0"/>
           </a:p>
@@ -3477,25 +3571,364 @@
       </p:sp>
       <p:sp>
         <p:nvSpPr>
-          <p:cNvPr id="3" name="Marcador de contenido 2">
-            <a:extLst>
-              <a:ext uri="{FF2B5EF4-FFF2-40B4-BE49-F238E27FC236}">
-                <a16:creationId xmlns:a16="http://schemas.microsoft.com/office/drawing/2014/main" id="{F2D2B6B5-311E-BF90-A82E-DD1C1183A794}"/>
-              </a:ext>
-            </a:extLst>
-          </p:cNvPr>
-          <p:cNvSpPr>
-            <a:spLocks noGrp="1"/>
-          </p:cNvSpPr>
-          <p:nvPr>
-            <p:ph idx="1"/>
-          </p:nvPr>
-        </p:nvSpPr>
-        <p:spPr/>
-        <p:txBody>
-          <a:bodyPr/>
+          <p:cNvPr id="5" name="Rectángulo 4">
+            <a:extLst>
+              <a:ext uri="{FF2B5EF4-FFF2-40B4-BE49-F238E27FC236}">
+                <a16:creationId xmlns:a16="http://schemas.microsoft.com/office/drawing/2014/main" id="{AE76F2AD-DCE1-10B1-90CA-4D3B17D23B38}"/>
+              </a:ext>
+            </a:extLst>
+          </p:cNvPr>
+          <p:cNvSpPr/>
+          <p:nvPr/>
+        </p:nvSpPr>
+        <p:spPr>
+          <a:xfrm>
+            <a:off x="264849" y="3028765"/>
+            <a:ext cx="2707690" cy="1553592"/>
+          </a:xfrm>
+          <a:prstGeom prst="rect">
+            <a:avLst/>
+          </a:prstGeom>
+        </p:spPr>
+        <p:style>
+          <a:lnRef idx="2">
+            <a:schemeClr val="accent6"/>
+          </a:lnRef>
+          <a:fillRef idx="1">
+            <a:schemeClr val="lt1"/>
+          </a:fillRef>
+          <a:effectRef idx="0">
+            <a:schemeClr val="accent6"/>
+          </a:effectRef>
+          <a:fontRef idx="minor">
+            <a:schemeClr val="dk1"/>
+          </a:fontRef>
+        </p:style>
+        <p:txBody>
+          <a:bodyPr rtlCol="0" anchor="ctr"/>
           <a:lstStyle/>
           <a:p>
+            <a:pPr algn="ctr"/>
+            <a:r>
+              <a:rPr lang="es-419" b="1" dirty="0"/>
+              <a:t>Modelo LLM de tipo Falcon</a:t>
+            </a:r>
+          </a:p>
+        </p:txBody>
+      </p:sp>
+      <p:sp>
+        <p:nvSpPr>
+          <p:cNvPr id="6" name="Rectángulo 5">
+            <a:extLst>
+              <a:ext uri="{FF2B5EF4-FFF2-40B4-BE49-F238E27FC236}">
+                <a16:creationId xmlns:a16="http://schemas.microsoft.com/office/drawing/2014/main" id="{652D1DBF-17D6-61B6-4027-B8A97063A60B}"/>
+              </a:ext>
+            </a:extLst>
+          </p:cNvPr>
+          <p:cNvSpPr/>
+          <p:nvPr/>
+        </p:nvSpPr>
+        <p:spPr>
+          <a:xfrm>
+            <a:off x="3236403" y="3028765"/>
+            <a:ext cx="2707690" cy="1553592"/>
+          </a:xfrm>
+          <a:prstGeom prst="rect">
+            <a:avLst/>
+          </a:prstGeom>
+        </p:spPr>
+        <p:style>
+          <a:lnRef idx="2">
+            <a:schemeClr val="accent6"/>
+          </a:lnRef>
+          <a:fillRef idx="1">
+            <a:schemeClr val="lt1"/>
+          </a:fillRef>
+          <a:effectRef idx="0">
+            <a:schemeClr val="accent6"/>
+          </a:effectRef>
+          <a:fontRef idx="minor">
+            <a:schemeClr val="dk1"/>
+          </a:fontRef>
+        </p:style>
+        <p:txBody>
+          <a:bodyPr rtlCol="0" anchor="ctr"/>
+          <a:lstStyle/>
+          <a:p>
+            <a:pPr algn="ctr"/>
+            <a:r>
+              <a:rPr lang="es-419" b="1" dirty="0"/>
+              <a:t>Modelo LLM de tipo LLama2</a:t>
+            </a:r>
+          </a:p>
+        </p:txBody>
+      </p:sp>
+      <p:sp>
+        <p:nvSpPr>
+          <p:cNvPr id="7" name="Rectángulo 6">
+            <a:extLst>
+              <a:ext uri="{FF2B5EF4-FFF2-40B4-BE49-F238E27FC236}">
+                <a16:creationId xmlns:a16="http://schemas.microsoft.com/office/drawing/2014/main" id="{94F12C77-1AEF-C3B7-754F-C19AD3AF1414}"/>
+              </a:ext>
+            </a:extLst>
+          </p:cNvPr>
+          <p:cNvSpPr/>
+          <p:nvPr/>
+        </p:nvSpPr>
+        <p:spPr>
+          <a:xfrm>
+            <a:off x="6207957" y="3028765"/>
+            <a:ext cx="2707690" cy="1553592"/>
+          </a:xfrm>
+          <a:prstGeom prst="rect">
+            <a:avLst/>
+          </a:prstGeom>
+        </p:spPr>
+        <p:style>
+          <a:lnRef idx="2">
+            <a:schemeClr val="accent6"/>
+          </a:lnRef>
+          <a:fillRef idx="1">
+            <a:schemeClr val="lt1"/>
+          </a:fillRef>
+          <a:effectRef idx="0">
+            <a:schemeClr val="accent6"/>
+          </a:effectRef>
+          <a:fontRef idx="minor">
+            <a:schemeClr val="dk1"/>
+          </a:fontRef>
+        </p:style>
+        <p:txBody>
+          <a:bodyPr rtlCol="0" anchor="ctr"/>
+          <a:lstStyle/>
+          <a:p>
+            <a:pPr algn="ctr"/>
+            <a:r>
+              <a:rPr lang="es-419" b="1" dirty="0"/>
+              <a:t>Modelo LLM de tipo Mistral</a:t>
+            </a:r>
+          </a:p>
+        </p:txBody>
+      </p:sp>
+      <p:sp>
+        <p:nvSpPr>
+          <p:cNvPr id="8" name="Rectángulo 7">
+            <a:extLst>
+              <a:ext uri="{FF2B5EF4-FFF2-40B4-BE49-F238E27FC236}">
+                <a16:creationId xmlns:a16="http://schemas.microsoft.com/office/drawing/2014/main" id="{64EB0A7E-6BBE-7976-9C64-5B7202916BE7}"/>
+              </a:ext>
+            </a:extLst>
+          </p:cNvPr>
+          <p:cNvSpPr/>
+          <p:nvPr/>
+        </p:nvSpPr>
+        <p:spPr>
+          <a:xfrm>
+            <a:off x="9219461" y="3028765"/>
+            <a:ext cx="2707690" cy="1553592"/>
+          </a:xfrm>
+          <a:prstGeom prst="rect">
+            <a:avLst/>
+          </a:prstGeom>
+        </p:spPr>
+        <p:style>
+          <a:lnRef idx="2">
+            <a:schemeClr val="accent6"/>
+          </a:lnRef>
+          <a:fillRef idx="1">
+            <a:schemeClr val="lt1"/>
+          </a:fillRef>
+          <a:effectRef idx="0">
+            <a:schemeClr val="accent6"/>
+          </a:effectRef>
+          <a:fontRef idx="minor">
+            <a:schemeClr val="dk1"/>
+          </a:fontRef>
+        </p:style>
+        <p:txBody>
+          <a:bodyPr rtlCol="0" anchor="ctr"/>
+          <a:lstStyle/>
+          <a:p>
+            <a:pPr algn="ctr"/>
+            <a:r>
+              <a:rPr lang="es-419" b="1" dirty="0"/>
+              <a:t>Modelo LLM de tipo Gemma</a:t>
+            </a:r>
+          </a:p>
+        </p:txBody>
+      </p:sp>
+      <p:sp>
+        <p:nvSpPr>
+          <p:cNvPr id="9" name="Flecha: a la derecha 8">
+            <a:extLst>
+              <a:ext uri="{FF2B5EF4-FFF2-40B4-BE49-F238E27FC236}">
+                <a16:creationId xmlns:a16="http://schemas.microsoft.com/office/drawing/2014/main" id="{00F5FA53-0A39-E8E0-923A-AF48F146A0A8}"/>
+              </a:ext>
+            </a:extLst>
+          </p:cNvPr>
+          <p:cNvSpPr/>
+          <p:nvPr/>
+        </p:nvSpPr>
+        <p:spPr>
+          <a:xfrm rot="20178424">
+            <a:off x="1784412" y="2343705"/>
+            <a:ext cx="1451991" cy="301841"/>
+          </a:xfrm>
+          <a:prstGeom prst="rightArrow">
+            <a:avLst/>
+          </a:prstGeom>
+        </p:spPr>
+        <p:style>
+          <a:lnRef idx="2">
+            <a:schemeClr val="accent6"/>
+          </a:lnRef>
+          <a:fillRef idx="1">
+            <a:schemeClr val="lt1"/>
+          </a:fillRef>
+          <a:effectRef idx="0">
+            <a:schemeClr val="accent6"/>
+          </a:effectRef>
+          <a:fontRef idx="minor">
+            <a:schemeClr val="dk1"/>
+          </a:fontRef>
+        </p:style>
+        <p:txBody>
+          <a:bodyPr rtlCol="0" anchor="ctr"/>
+          <a:lstStyle/>
+          <a:p>
+            <a:pPr algn="ctr"/>
+            <a:endParaRPr lang="en-US"/>
+          </a:p>
+        </p:txBody>
+      </p:sp>
+      <p:sp>
+        <p:nvSpPr>
+          <p:cNvPr id="10" name="Flecha: a la derecha 9">
+            <a:extLst>
+              <a:ext uri="{FF2B5EF4-FFF2-40B4-BE49-F238E27FC236}">
+                <a16:creationId xmlns:a16="http://schemas.microsoft.com/office/drawing/2014/main" id="{703F87E8-A786-24CE-2A02-DA72F8CF93D5}"/>
+              </a:ext>
+            </a:extLst>
+          </p:cNvPr>
+          <p:cNvSpPr/>
+          <p:nvPr/>
+        </p:nvSpPr>
+        <p:spPr>
+          <a:xfrm rot="12641252">
+            <a:off x="8737106" y="2273333"/>
+            <a:ext cx="1451991" cy="301841"/>
+          </a:xfrm>
+          <a:prstGeom prst="rightArrow">
+            <a:avLst/>
+          </a:prstGeom>
+        </p:spPr>
+        <p:style>
+          <a:lnRef idx="2">
+            <a:schemeClr val="accent6"/>
+          </a:lnRef>
+          <a:fillRef idx="1">
+            <a:schemeClr val="lt1"/>
+          </a:fillRef>
+          <a:effectRef idx="0">
+            <a:schemeClr val="accent6"/>
+          </a:effectRef>
+          <a:fontRef idx="minor">
+            <a:schemeClr val="dk1"/>
+          </a:fontRef>
+        </p:style>
+        <p:txBody>
+          <a:bodyPr rtlCol="0" anchor="ctr"/>
+          <a:lstStyle/>
+          <a:p>
+            <a:pPr algn="ctr"/>
+            <a:endParaRPr lang="en-US"/>
+          </a:p>
+        </p:txBody>
+      </p:sp>
+      <p:sp>
+        <p:nvSpPr>
+          <p:cNvPr id="13" name="Flecha: a la derecha 12">
+            <a:extLst>
+              <a:ext uri="{FF2B5EF4-FFF2-40B4-BE49-F238E27FC236}">
+                <a16:creationId xmlns:a16="http://schemas.microsoft.com/office/drawing/2014/main" id="{230DFB9A-3E1E-DC00-4CD4-B395C5E78921}"/>
+              </a:ext>
+            </a:extLst>
+          </p:cNvPr>
+          <p:cNvSpPr/>
+          <p:nvPr/>
+        </p:nvSpPr>
+        <p:spPr>
+          <a:xfrm rot="12641252">
+            <a:off x="6945976" y="2397830"/>
+            <a:ext cx="964110" cy="301841"/>
+          </a:xfrm>
+          <a:prstGeom prst="rightArrow">
+            <a:avLst/>
+          </a:prstGeom>
+        </p:spPr>
+        <p:style>
+          <a:lnRef idx="2">
+            <a:schemeClr val="accent6"/>
+          </a:lnRef>
+          <a:fillRef idx="1">
+            <a:schemeClr val="lt1"/>
+          </a:fillRef>
+          <a:effectRef idx="0">
+            <a:schemeClr val="accent6"/>
+          </a:effectRef>
+          <a:fontRef idx="minor">
+            <a:schemeClr val="dk1"/>
+          </a:fontRef>
+        </p:style>
+        <p:txBody>
+          <a:bodyPr rtlCol="0" anchor="ctr"/>
+          <a:lstStyle/>
+          <a:p>
+            <a:pPr algn="ctr"/>
+            <a:endParaRPr lang="en-US"/>
+          </a:p>
+        </p:txBody>
+      </p:sp>
+      <p:sp>
+        <p:nvSpPr>
+          <p:cNvPr id="14" name="Flecha: a la derecha 13">
+            <a:extLst>
+              <a:ext uri="{FF2B5EF4-FFF2-40B4-BE49-F238E27FC236}">
+                <a16:creationId xmlns:a16="http://schemas.microsoft.com/office/drawing/2014/main" id="{6E9A1946-AC4A-41DD-A628-53B2112E6C41}"/>
+              </a:ext>
+            </a:extLst>
+          </p:cNvPr>
+          <p:cNvSpPr/>
+          <p:nvPr/>
+        </p:nvSpPr>
+        <p:spPr>
+          <a:xfrm rot="19514358">
+            <a:off x="4486202" y="2374804"/>
+            <a:ext cx="964110" cy="301841"/>
+          </a:xfrm>
+          <a:prstGeom prst="rightArrow">
+            <a:avLst/>
+          </a:prstGeom>
+        </p:spPr>
+        <p:style>
+          <a:lnRef idx="2">
+            <a:schemeClr val="accent6"/>
+          </a:lnRef>
+          <a:fillRef idx="1">
+            <a:schemeClr val="lt1"/>
+          </a:fillRef>
+          <a:effectRef idx="0">
+            <a:schemeClr val="accent6"/>
+          </a:effectRef>
+          <a:fontRef idx="minor">
+            <a:schemeClr val="dk1"/>
+          </a:fontRef>
+        </p:style>
+        <p:txBody>
+          <a:bodyPr rtlCol="0" anchor="ctr"/>
+          <a:lstStyle/>
+          <a:p>
+            <a:pPr algn="ctr"/>
             <a:endParaRPr lang="en-US"/>
           </a:p>
         </p:txBody>
@@ -3503,7 +3936,7 @@
     </p:spTree>
     <p:extLst>
       <p:ext uri="{BB962C8B-B14F-4D97-AF65-F5344CB8AC3E}">
-        <p14:creationId xmlns:p14="http://schemas.microsoft.com/office/powerpoint/2010/main" val="2128825742"/>
+        <p14:creationId xmlns:p14="http://schemas.microsoft.com/office/powerpoint/2010/main" val="1908628286"/>
       </p:ext>
     </p:extLst>
   </p:cSld>
@@ -3530,6 +3963,1491 @@
           <a:chExt cx="0" cy="0"/>
         </a:xfrm>
       </p:grpSpPr>
+      <p:pic>
+        <p:nvPicPr>
+          <p:cNvPr id="6" name="Imagen 5">
+            <a:extLst>
+              <a:ext uri="{FF2B5EF4-FFF2-40B4-BE49-F238E27FC236}">
+                <a16:creationId xmlns:a16="http://schemas.microsoft.com/office/drawing/2014/main" id="{2F70CFA3-FB43-14FC-274E-CD16E9DDE054}"/>
+              </a:ext>
+            </a:extLst>
+          </p:cNvPr>
+          <p:cNvPicPr>
+            <a:picLocks noChangeAspect="1"/>
+          </p:cNvPicPr>
+          <p:nvPr/>
+        </p:nvPicPr>
+        <p:blipFill>
+          <a:blip r:embed="rId2"/>
+          <a:stretch>
+            <a:fillRect/>
+          </a:stretch>
+        </p:blipFill>
+        <p:spPr>
+          <a:xfrm>
+            <a:off x="261274" y="1216384"/>
+            <a:ext cx="1325563" cy="1325563"/>
+          </a:xfrm>
+          <a:prstGeom prst="rect">
+            <a:avLst/>
+          </a:prstGeom>
+        </p:spPr>
+      </p:pic>
+      <p:pic>
+        <p:nvPicPr>
+          <p:cNvPr id="7" name="Imagen 6">
+            <a:extLst>
+              <a:ext uri="{FF2B5EF4-FFF2-40B4-BE49-F238E27FC236}">
+                <a16:creationId xmlns:a16="http://schemas.microsoft.com/office/drawing/2014/main" id="{C9792E66-85BF-EE0E-ED33-1EC4428BC8C3}"/>
+              </a:ext>
+            </a:extLst>
+          </p:cNvPr>
+          <p:cNvPicPr>
+            <a:picLocks noChangeAspect="1"/>
+          </p:cNvPicPr>
+          <p:nvPr/>
+        </p:nvPicPr>
+        <p:blipFill>
+          <a:blip r:embed="rId3"/>
+          <a:stretch>
+            <a:fillRect/>
+          </a:stretch>
+        </p:blipFill>
+        <p:spPr>
+          <a:xfrm>
+            <a:off x="2573111" y="2710725"/>
+            <a:ext cx="1325563" cy="1325563"/>
+          </a:xfrm>
+          <a:prstGeom prst="rect">
+            <a:avLst/>
+          </a:prstGeom>
+        </p:spPr>
+      </p:pic>
+      <p:pic>
+        <p:nvPicPr>
+          <p:cNvPr id="8" name="Imagen 7">
+            <a:extLst>
+              <a:ext uri="{FF2B5EF4-FFF2-40B4-BE49-F238E27FC236}">
+                <a16:creationId xmlns:a16="http://schemas.microsoft.com/office/drawing/2014/main" id="{BB3B4684-49B2-6DC7-FEFB-5BDA92F07A30}"/>
+              </a:ext>
+            </a:extLst>
+          </p:cNvPr>
+          <p:cNvPicPr>
+            <a:picLocks noChangeAspect="1"/>
+          </p:cNvPicPr>
+          <p:nvPr/>
+        </p:nvPicPr>
+        <p:blipFill>
+          <a:blip r:embed="rId2"/>
+          <a:stretch>
+            <a:fillRect/>
+          </a:stretch>
+        </p:blipFill>
+        <p:spPr>
+          <a:xfrm>
+            <a:off x="402453" y="5049458"/>
+            <a:ext cx="1254711" cy="1254711"/>
+          </a:xfrm>
+          <a:prstGeom prst="rect">
+            <a:avLst/>
+          </a:prstGeom>
+        </p:spPr>
+      </p:pic>
+      <p:pic>
+        <p:nvPicPr>
+          <p:cNvPr id="10" name="Imagen 9">
+            <a:extLst>
+              <a:ext uri="{FF2B5EF4-FFF2-40B4-BE49-F238E27FC236}">
+                <a16:creationId xmlns:a16="http://schemas.microsoft.com/office/drawing/2014/main" id="{02E2829D-AB36-75AC-FB4C-11BE5E7ACB8D}"/>
+              </a:ext>
+            </a:extLst>
+          </p:cNvPr>
+          <p:cNvPicPr>
+            <a:picLocks noChangeAspect="1"/>
+          </p:cNvPicPr>
+          <p:nvPr/>
+        </p:nvPicPr>
+        <p:blipFill>
+          <a:blip r:embed="rId4"/>
+          <a:stretch>
+            <a:fillRect/>
+          </a:stretch>
+        </p:blipFill>
+        <p:spPr>
+          <a:xfrm>
+            <a:off x="367028" y="3272192"/>
+            <a:ext cx="1325563" cy="1325563"/>
+          </a:xfrm>
+          <a:prstGeom prst="rect">
+            <a:avLst/>
+          </a:prstGeom>
+        </p:spPr>
+      </p:pic>
+      <p:pic>
+        <p:nvPicPr>
+          <p:cNvPr id="11" name="Imagen 10">
+            <a:extLst>
+              <a:ext uri="{FF2B5EF4-FFF2-40B4-BE49-F238E27FC236}">
+                <a16:creationId xmlns:a16="http://schemas.microsoft.com/office/drawing/2014/main" id="{A61BCBB2-B4B0-F57C-064B-ABD2B0F89E3B}"/>
+              </a:ext>
+            </a:extLst>
+          </p:cNvPr>
+          <p:cNvPicPr>
+            <a:picLocks noChangeAspect="1"/>
+          </p:cNvPicPr>
+          <p:nvPr/>
+        </p:nvPicPr>
+        <p:blipFill>
+          <a:blip r:embed="rId5"/>
+          <a:stretch>
+            <a:fillRect/>
+          </a:stretch>
+        </p:blipFill>
+        <p:spPr>
+          <a:xfrm>
+            <a:off x="4667184" y="1529002"/>
+            <a:ext cx="1088458" cy="1088458"/>
+          </a:xfrm>
+          <a:prstGeom prst="rect">
+            <a:avLst/>
+          </a:prstGeom>
+        </p:spPr>
+      </p:pic>
+      <p:sp>
+        <p:nvSpPr>
+          <p:cNvPr id="14" name="CuadroTexto 13">
+            <a:extLst>
+              <a:ext uri="{FF2B5EF4-FFF2-40B4-BE49-F238E27FC236}">
+                <a16:creationId xmlns:a16="http://schemas.microsoft.com/office/drawing/2014/main" id="{7829E638-1D11-6CD3-F48D-7EC30A525040}"/>
+              </a:ext>
+            </a:extLst>
+          </p:cNvPr>
+          <p:cNvSpPr txBox="1"/>
+          <p:nvPr/>
+        </p:nvSpPr>
+        <p:spPr>
+          <a:xfrm>
+            <a:off x="4398884" y="3112958"/>
+            <a:ext cx="4045364" cy="923330"/>
+          </a:xfrm>
+          <a:prstGeom prst="rect">
+            <a:avLst/>
+          </a:prstGeom>
+          <a:noFill/>
+        </p:spPr>
+        <p:txBody>
+          <a:bodyPr wrap="square" rtlCol="0">
+            <a:spAutoFit/>
+          </a:bodyPr>
+          <a:lstStyle/>
+          <a:p>
+            <a:r>
+              <a:rPr lang="es-419" b="1" i="1" dirty="0"/>
+              <a:t>Usar, durante el autoajuste, una técnica de mezcla de modelos:</a:t>
+            </a:r>
+          </a:p>
+          <a:p>
+            <a:r>
+              <a:rPr lang="es-419" dirty="0"/>
+              <a:t>TIES y DARE (Ver artículo de </a:t>
+            </a:r>
+            <a:r>
+              <a:rPr lang="es-419" dirty="0" err="1"/>
+              <a:t>BioMistral</a:t>
+            </a:r>
+            <a:r>
+              <a:rPr lang="es-419" dirty="0"/>
+              <a:t>)</a:t>
+            </a:r>
+            <a:endParaRPr lang="en-US" dirty="0"/>
+          </a:p>
+        </p:txBody>
+      </p:sp>
+      <p:sp>
+        <p:nvSpPr>
+          <p:cNvPr id="15" name="CuadroTexto 14">
+            <a:extLst>
+              <a:ext uri="{FF2B5EF4-FFF2-40B4-BE49-F238E27FC236}">
+                <a16:creationId xmlns:a16="http://schemas.microsoft.com/office/drawing/2014/main" id="{F1F8DB62-1651-67B5-5BC5-D4E1E8D0F5E1}"/>
+              </a:ext>
+            </a:extLst>
+          </p:cNvPr>
+          <p:cNvSpPr txBox="1"/>
+          <p:nvPr/>
+        </p:nvSpPr>
+        <p:spPr>
+          <a:xfrm>
+            <a:off x="195308" y="4638940"/>
+            <a:ext cx="2450237" cy="276999"/>
+          </a:xfrm>
+          <a:prstGeom prst="rect">
+            <a:avLst/>
+          </a:prstGeom>
+          <a:noFill/>
+        </p:spPr>
+        <p:txBody>
+          <a:bodyPr wrap="square" rtlCol="0">
+            <a:spAutoFit/>
+          </a:bodyPr>
+          <a:lstStyle/>
+          <a:p>
+            <a:r>
+              <a:rPr lang="es-419" sz="1200" i="1" dirty="0"/>
+              <a:t>Libros de medicina en español</a:t>
+            </a:r>
+            <a:endParaRPr lang="en-US" sz="1200" i="1" dirty="0"/>
+          </a:p>
+        </p:txBody>
+      </p:sp>
+      <p:sp>
+        <p:nvSpPr>
+          <p:cNvPr id="17" name="Rectángulo 16">
+            <a:extLst>
+              <a:ext uri="{FF2B5EF4-FFF2-40B4-BE49-F238E27FC236}">
+                <a16:creationId xmlns:a16="http://schemas.microsoft.com/office/drawing/2014/main" id="{B785C0B4-B38A-8590-E394-4439C969795F}"/>
+              </a:ext>
+            </a:extLst>
+          </p:cNvPr>
+          <p:cNvSpPr/>
+          <p:nvPr/>
+        </p:nvSpPr>
+        <p:spPr>
+          <a:xfrm>
+            <a:off x="4081980" y="1385161"/>
+            <a:ext cx="4112109" cy="1325563"/>
+          </a:xfrm>
+          <a:prstGeom prst="rect">
+            <a:avLst/>
+          </a:prstGeom>
+          <a:noFill/>
+        </p:spPr>
+        <p:style>
+          <a:lnRef idx="2">
+            <a:schemeClr val="accent6"/>
+          </a:lnRef>
+          <a:fillRef idx="1">
+            <a:schemeClr val="lt1"/>
+          </a:fillRef>
+          <a:effectRef idx="0">
+            <a:schemeClr val="accent6"/>
+          </a:effectRef>
+          <a:fontRef idx="minor">
+            <a:schemeClr val="dk1"/>
+          </a:fontRef>
+        </p:style>
+        <p:txBody>
+          <a:bodyPr vert="wordArtVert" rtlCol="0" anchor="ctr"/>
+          <a:lstStyle/>
+          <a:p>
+            <a:pPr lvl="1" algn="r"/>
+            <a:endParaRPr lang="en-US" dirty="0"/>
+          </a:p>
+        </p:txBody>
+      </p:sp>
+      <p:sp>
+        <p:nvSpPr>
+          <p:cNvPr id="18" name="CuadroTexto 17">
+            <a:extLst>
+              <a:ext uri="{FF2B5EF4-FFF2-40B4-BE49-F238E27FC236}">
+                <a16:creationId xmlns:a16="http://schemas.microsoft.com/office/drawing/2014/main" id="{3BC03D44-FFDF-CEE7-9C22-26BBC83F258F}"/>
+              </a:ext>
+            </a:extLst>
+          </p:cNvPr>
+          <p:cNvSpPr txBox="1"/>
+          <p:nvPr/>
+        </p:nvSpPr>
+        <p:spPr>
+          <a:xfrm>
+            <a:off x="6094791" y="1574469"/>
+            <a:ext cx="2498793" cy="1200329"/>
+          </a:xfrm>
+          <a:prstGeom prst="rect">
+            <a:avLst/>
+          </a:prstGeom>
+          <a:noFill/>
+        </p:spPr>
+        <p:txBody>
+          <a:bodyPr wrap="square" rtlCol="0">
+            <a:spAutoFit/>
+          </a:bodyPr>
+          <a:lstStyle/>
+          <a:p>
+            <a:r>
+              <a:rPr lang="es-419" dirty="0"/>
+              <a:t>Usar LLM base:</a:t>
+            </a:r>
+          </a:p>
+          <a:p>
+            <a:pPr marL="285750" indent="-285750">
+              <a:buFont typeface="Arial" panose="020B0604020202020204" pitchFamily="34" charset="0"/>
+              <a:buChar char="•"/>
+            </a:pPr>
+            <a:r>
+              <a:rPr lang="es-419" dirty="0" err="1"/>
+              <a:t>BioMistal</a:t>
+            </a:r>
+            <a:endParaRPr lang="es-419" dirty="0"/>
+          </a:p>
+          <a:p>
+            <a:pPr marL="285750" indent="-285750">
+              <a:buFont typeface="Arial" panose="020B0604020202020204" pitchFamily="34" charset="0"/>
+              <a:buChar char="•"/>
+            </a:pPr>
+            <a:r>
+              <a:rPr lang="es-419" dirty="0"/>
+              <a:t>Modelo para contexto Médico</a:t>
+            </a:r>
+            <a:endParaRPr lang="en-US" dirty="0"/>
+          </a:p>
+        </p:txBody>
+      </p:sp>
+      <p:sp>
+        <p:nvSpPr>
+          <p:cNvPr id="19" name="CuadroTexto 18">
+            <a:extLst>
+              <a:ext uri="{FF2B5EF4-FFF2-40B4-BE49-F238E27FC236}">
+                <a16:creationId xmlns:a16="http://schemas.microsoft.com/office/drawing/2014/main" id="{301BC45D-4762-9A49-139F-4D7491A5CF89}"/>
+              </a:ext>
+            </a:extLst>
+          </p:cNvPr>
+          <p:cNvSpPr txBox="1"/>
+          <p:nvPr/>
+        </p:nvSpPr>
+        <p:spPr>
+          <a:xfrm>
+            <a:off x="3060852" y="199452"/>
+            <a:ext cx="6067877" cy="400110"/>
+          </a:xfrm>
+          <a:prstGeom prst="rect">
+            <a:avLst/>
+          </a:prstGeom>
+          <a:noFill/>
+        </p:spPr>
+        <p:txBody>
+          <a:bodyPr wrap="square" rtlCol="0">
+            <a:spAutoFit/>
+          </a:bodyPr>
+          <a:lstStyle/>
+          <a:p>
+            <a:r>
+              <a:rPr lang="es-419" sz="2000" b="1" dirty="0"/>
+              <a:t>Proceso de entrenamiento para un autoajuste del LLM</a:t>
+            </a:r>
+            <a:endParaRPr lang="en-US" sz="2000" b="1" dirty="0"/>
+          </a:p>
+        </p:txBody>
+      </p:sp>
+      <p:sp>
+        <p:nvSpPr>
+          <p:cNvPr id="22" name="Flecha: a la derecha 21">
+            <a:extLst>
+              <a:ext uri="{FF2B5EF4-FFF2-40B4-BE49-F238E27FC236}">
+                <a16:creationId xmlns:a16="http://schemas.microsoft.com/office/drawing/2014/main" id="{52C490CF-2C2F-F300-175F-302AC7A3A690}"/>
+              </a:ext>
+            </a:extLst>
+          </p:cNvPr>
+          <p:cNvSpPr/>
+          <p:nvPr/>
+        </p:nvSpPr>
+        <p:spPr>
+          <a:xfrm rot="19876319">
+            <a:off x="3377376" y="2329469"/>
+            <a:ext cx="710214" cy="177554"/>
+          </a:xfrm>
+          <a:prstGeom prst="rightArrow">
+            <a:avLst/>
+          </a:prstGeom>
+        </p:spPr>
+        <p:style>
+          <a:lnRef idx="2">
+            <a:schemeClr val="accent1">
+              <a:shade val="15000"/>
+            </a:schemeClr>
+          </a:lnRef>
+          <a:fillRef idx="1">
+            <a:schemeClr val="accent1"/>
+          </a:fillRef>
+          <a:effectRef idx="0">
+            <a:schemeClr val="accent1"/>
+          </a:effectRef>
+          <a:fontRef idx="minor">
+            <a:schemeClr val="lt1"/>
+          </a:fontRef>
+        </p:style>
+        <p:txBody>
+          <a:bodyPr rtlCol="0" anchor="ctr"/>
+          <a:lstStyle/>
+          <a:p>
+            <a:pPr algn="ctr"/>
+            <a:endParaRPr lang="en-US"/>
+          </a:p>
+        </p:txBody>
+      </p:sp>
+      <p:sp>
+        <p:nvSpPr>
+          <p:cNvPr id="23" name="Flecha: a la derecha 22">
+            <a:extLst>
+              <a:ext uri="{FF2B5EF4-FFF2-40B4-BE49-F238E27FC236}">
+                <a16:creationId xmlns:a16="http://schemas.microsoft.com/office/drawing/2014/main" id="{89D27A45-83CD-32B3-B138-48C4121A8A75}"/>
+              </a:ext>
+            </a:extLst>
+          </p:cNvPr>
+          <p:cNvSpPr/>
+          <p:nvPr/>
+        </p:nvSpPr>
+        <p:spPr>
+          <a:xfrm rot="8973099">
+            <a:off x="3892857" y="2915122"/>
+            <a:ext cx="710214" cy="177554"/>
+          </a:xfrm>
+          <a:prstGeom prst="rightArrow">
+            <a:avLst/>
+          </a:prstGeom>
+        </p:spPr>
+        <p:style>
+          <a:lnRef idx="2">
+            <a:schemeClr val="accent1">
+              <a:shade val="15000"/>
+            </a:schemeClr>
+          </a:lnRef>
+          <a:fillRef idx="1">
+            <a:schemeClr val="accent1"/>
+          </a:fillRef>
+          <a:effectRef idx="0">
+            <a:schemeClr val="accent1"/>
+          </a:effectRef>
+          <a:fontRef idx="minor">
+            <a:schemeClr val="lt1"/>
+          </a:fontRef>
+        </p:style>
+        <p:txBody>
+          <a:bodyPr rtlCol="0" anchor="ctr"/>
+          <a:lstStyle/>
+          <a:p>
+            <a:pPr algn="ctr"/>
+            <a:endParaRPr lang="en-US"/>
+          </a:p>
+        </p:txBody>
+      </p:sp>
+      <p:sp>
+        <p:nvSpPr>
+          <p:cNvPr id="26" name="CuadroTexto 25">
+            <a:extLst>
+              <a:ext uri="{FF2B5EF4-FFF2-40B4-BE49-F238E27FC236}">
+                <a16:creationId xmlns:a16="http://schemas.microsoft.com/office/drawing/2014/main" id="{B10B70F9-6A6A-0FA0-A4A4-923CAF931B81}"/>
+              </a:ext>
+            </a:extLst>
+          </p:cNvPr>
+          <p:cNvSpPr txBox="1"/>
+          <p:nvPr/>
+        </p:nvSpPr>
+        <p:spPr>
+          <a:xfrm>
+            <a:off x="232340" y="770195"/>
+            <a:ext cx="2376172" cy="369332"/>
+          </a:xfrm>
+          <a:prstGeom prst="rect">
+            <a:avLst/>
+          </a:prstGeom>
+          <a:noFill/>
+        </p:spPr>
+        <p:txBody>
+          <a:bodyPr wrap="square" rtlCol="0">
+            <a:spAutoFit/>
+          </a:bodyPr>
+          <a:lstStyle/>
+          <a:p>
+            <a:r>
+              <a:rPr lang="es-419" i="1" dirty="0"/>
+              <a:t>Conjunto de Datos</a:t>
+            </a:r>
+            <a:endParaRPr lang="en-US" i="1" dirty="0"/>
+          </a:p>
+        </p:txBody>
+      </p:sp>
+      <p:sp>
+        <p:nvSpPr>
+          <p:cNvPr id="29" name="CuadroTexto 28">
+            <a:extLst>
+              <a:ext uri="{FF2B5EF4-FFF2-40B4-BE49-F238E27FC236}">
+                <a16:creationId xmlns:a16="http://schemas.microsoft.com/office/drawing/2014/main" id="{335F2351-B878-8EDC-1FCA-9C6B99D8EA0C}"/>
+              </a:ext>
+            </a:extLst>
+          </p:cNvPr>
+          <p:cNvSpPr txBox="1"/>
+          <p:nvPr/>
+        </p:nvSpPr>
+        <p:spPr>
+          <a:xfrm>
+            <a:off x="153879" y="6314299"/>
+            <a:ext cx="2793507" cy="461665"/>
+          </a:xfrm>
+          <a:prstGeom prst="rect">
+            <a:avLst/>
+          </a:prstGeom>
+          <a:noFill/>
+        </p:spPr>
+        <p:txBody>
+          <a:bodyPr wrap="square" rtlCol="0">
+            <a:spAutoFit/>
+          </a:bodyPr>
+          <a:lstStyle/>
+          <a:p>
+            <a:r>
+              <a:rPr lang="es-419" sz="1200" i="1" dirty="0"/>
+              <a:t>Conjunto de preguntas y respuestas en español</a:t>
+            </a:r>
+            <a:endParaRPr lang="en-US" sz="1200" i="1" dirty="0"/>
+          </a:p>
+        </p:txBody>
+      </p:sp>
+      <p:sp>
+        <p:nvSpPr>
+          <p:cNvPr id="30" name="CuadroTexto 29">
+            <a:extLst>
+              <a:ext uri="{FF2B5EF4-FFF2-40B4-BE49-F238E27FC236}">
+                <a16:creationId xmlns:a16="http://schemas.microsoft.com/office/drawing/2014/main" id="{B3FAA69D-E61E-42B5-26B5-5F5C90BB8012}"/>
+              </a:ext>
+            </a:extLst>
+          </p:cNvPr>
+          <p:cNvSpPr txBox="1"/>
+          <p:nvPr/>
+        </p:nvSpPr>
+        <p:spPr>
+          <a:xfrm>
+            <a:off x="136038" y="2617460"/>
+            <a:ext cx="2450237" cy="276999"/>
+          </a:xfrm>
+          <a:prstGeom prst="rect">
+            <a:avLst/>
+          </a:prstGeom>
+          <a:noFill/>
+        </p:spPr>
+        <p:txBody>
+          <a:bodyPr wrap="square" rtlCol="0">
+            <a:spAutoFit/>
+          </a:bodyPr>
+          <a:lstStyle/>
+          <a:p>
+            <a:r>
+              <a:rPr lang="es-419" sz="1200" i="1" dirty="0"/>
+              <a:t>Artículos de medicina en español</a:t>
+            </a:r>
+            <a:endParaRPr lang="en-US" sz="1200" i="1" dirty="0"/>
+          </a:p>
+        </p:txBody>
+      </p:sp>
+      <p:sp>
+        <p:nvSpPr>
+          <p:cNvPr id="31" name="Flecha: a la derecha 30">
+            <a:extLst>
+              <a:ext uri="{FF2B5EF4-FFF2-40B4-BE49-F238E27FC236}">
+                <a16:creationId xmlns:a16="http://schemas.microsoft.com/office/drawing/2014/main" id="{25E418CF-3996-EB14-30AF-B2063263749C}"/>
+              </a:ext>
+            </a:extLst>
+          </p:cNvPr>
+          <p:cNvSpPr/>
+          <p:nvPr/>
+        </p:nvSpPr>
+        <p:spPr>
+          <a:xfrm rot="19876319">
+            <a:off x="1769441" y="3626232"/>
+            <a:ext cx="710214" cy="177554"/>
+          </a:xfrm>
+          <a:prstGeom prst="rightArrow">
+            <a:avLst/>
+          </a:prstGeom>
+          <a:noFill/>
+        </p:spPr>
+        <p:style>
+          <a:lnRef idx="2">
+            <a:schemeClr val="accent1">
+              <a:shade val="15000"/>
+            </a:schemeClr>
+          </a:lnRef>
+          <a:fillRef idx="1">
+            <a:schemeClr val="accent1"/>
+          </a:fillRef>
+          <a:effectRef idx="0">
+            <a:schemeClr val="accent1"/>
+          </a:effectRef>
+          <a:fontRef idx="minor">
+            <a:schemeClr val="lt1"/>
+          </a:fontRef>
+        </p:style>
+        <p:txBody>
+          <a:bodyPr rtlCol="0" anchor="ctr"/>
+          <a:lstStyle/>
+          <a:p>
+            <a:pPr algn="ctr"/>
+            <a:endParaRPr lang="en-US" dirty="0"/>
+          </a:p>
+        </p:txBody>
+      </p:sp>
+      <p:sp>
+        <p:nvSpPr>
+          <p:cNvPr id="32" name="CuadroTexto 31">
+            <a:extLst>
+              <a:ext uri="{FF2B5EF4-FFF2-40B4-BE49-F238E27FC236}">
+                <a16:creationId xmlns:a16="http://schemas.microsoft.com/office/drawing/2014/main" id="{FE5ECDA7-246C-E2E7-A340-83BBFF220B1A}"/>
+              </a:ext>
+            </a:extLst>
+          </p:cNvPr>
+          <p:cNvSpPr txBox="1"/>
+          <p:nvPr/>
+        </p:nvSpPr>
+        <p:spPr>
+          <a:xfrm>
+            <a:off x="1537209" y="3020767"/>
+            <a:ext cx="1035902" cy="369332"/>
+          </a:xfrm>
+          <a:prstGeom prst="rect">
+            <a:avLst/>
+          </a:prstGeom>
+          <a:noFill/>
+        </p:spPr>
+        <p:txBody>
+          <a:bodyPr wrap="square" rtlCol="0">
+            <a:spAutoFit/>
+          </a:bodyPr>
+          <a:lstStyle/>
+          <a:p>
+            <a:r>
+              <a:rPr lang="es-419" dirty="0">
+                <a:solidFill>
+                  <a:srgbClr val="FF0000"/>
+                </a:solidFill>
+              </a:rPr>
+              <a:t>Entrenar</a:t>
+            </a:r>
+            <a:endParaRPr lang="en-US" dirty="0">
+              <a:solidFill>
+                <a:srgbClr val="FF0000"/>
+              </a:solidFill>
+            </a:endParaRPr>
+          </a:p>
+        </p:txBody>
+      </p:sp>
+      <p:sp>
+        <p:nvSpPr>
+          <p:cNvPr id="34" name="CuadroTexto 33">
+            <a:extLst>
+              <a:ext uri="{FF2B5EF4-FFF2-40B4-BE49-F238E27FC236}">
+                <a16:creationId xmlns:a16="http://schemas.microsoft.com/office/drawing/2014/main" id="{ABEA09B6-837A-60A3-02E5-D920D6B86D19}"/>
+              </a:ext>
+            </a:extLst>
+          </p:cNvPr>
+          <p:cNvSpPr txBox="1"/>
+          <p:nvPr/>
+        </p:nvSpPr>
+        <p:spPr>
+          <a:xfrm>
+            <a:off x="4063746" y="956661"/>
+            <a:ext cx="6094520" cy="369332"/>
+          </a:xfrm>
+          <a:prstGeom prst="rect">
+            <a:avLst/>
+          </a:prstGeom>
+          <a:noFill/>
+        </p:spPr>
+        <p:txBody>
+          <a:bodyPr wrap="square">
+            <a:spAutoFit/>
+          </a:bodyPr>
+          <a:lstStyle/>
+          <a:p>
+            <a:r>
+              <a:rPr lang="en-US" b="1" i="1" dirty="0"/>
+              <a:t>Direct Preference Optimization (DPO)</a:t>
+            </a:r>
+          </a:p>
+        </p:txBody>
+      </p:sp>
+      <p:sp>
+        <p:nvSpPr>
+          <p:cNvPr id="35" name="CuadroTexto 34">
+            <a:extLst>
+              <a:ext uri="{FF2B5EF4-FFF2-40B4-BE49-F238E27FC236}">
+                <a16:creationId xmlns:a16="http://schemas.microsoft.com/office/drawing/2014/main" id="{FC2FDD67-4E7E-880B-28BE-3B64321CCEC0}"/>
+              </a:ext>
+            </a:extLst>
+          </p:cNvPr>
+          <p:cNvSpPr txBox="1"/>
+          <p:nvPr/>
+        </p:nvSpPr>
+        <p:spPr>
+          <a:xfrm>
+            <a:off x="2228296" y="4136089"/>
+            <a:ext cx="2279090" cy="369332"/>
+          </a:xfrm>
+          <a:prstGeom prst="rect">
+            <a:avLst/>
+          </a:prstGeom>
+          <a:noFill/>
+        </p:spPr>
+        <p:txBody>
+          <a:bodyPr wrap="square" rtlCol="0">
+            <a:spAutoFit/>
+          </a:bodyPr>
+          <a:lstStyle/>
+          <a:p>
+            <a:r>
+              <a:rPr lang="es-419" b="1" i="1" dirty="0" err="1"/>
+              <a:t>SpanishMedicaLLM</a:t>
+            </a:r>
+            <a:endParaRPr lang="en-US" b="1" i="1" dirty="0"/>
+          </a:p>
+        </p:txBody>
+      </p:sp>
+    </p:spTree>
+    <p:extLst>
+      <p:ext uri="{BB962C8B-B14F-4D97-AF65-F5344CB8AC3E}">
+        <p14:creationId xmlns:p14="http://schemas.microsoft.com/office/powerpoint/2010/main" val="3683717391"/>
+      </p:ext>
+    </p:extLst>
+  </p:cSld>
+  <p:clrMapOvr>
+    <a:masterClrMapping/>
+  </p:clrMapOvr>
+</p:sld>
+</file>
+
+<file path=ppt/slides/slide12.xml><?xml version="1.0" encoding="utf-8"?>
+<p:sld xmlns:a="http://schemas.openxmlformats.org/drawingml/2006/main" xmlns:r="http://schemas.openxmlformats.org/officeDocument/2006/relationships" xmlns:p="http://schemas.openxmlformats.org/presentationml/2006/main">
+  <p:cSld>
+    <p:spTree>
+      <p:nvGrpSpPr>
+        <p:cNvPr id="1" name=""/>
+        <p:cNvGrpSpPr/>
+        <p:nvPr/>
+      </p:nvGrpSpPr>
+      <p:grpSpPr>
+        <a:xfrm>
+          <a:off x="0" y="0"/>
+          <a:ext cx="0" cy="0"/>
+          <a:chOff x="0" y="0"/>
+          <a:chExt cx="0" cy="0"/>
+        </a:xfrm>
+      </p:grpSpPr>
+      <p:pic>
+        <p:nvPicPr>
+          <p:cNvPr id="6" name="Imagen 5">
+            <a:extLst>
+              <a:ext uri="{FF2B5EF4-FFF2-40B4-BE49-F238E27FC236}">
+                <a16:creationId xmlns:a16="http://schemas.microsoft.com/office/drawing/2014/main" id="{2F70CFA3-FB43-14FC-274E-CD16E9DDE054}"/>
+              </a:ext>
+            </a:extLst>
+          </p:cNvPr>
+          <p:cNvPicPr>
+            <a:picLocks noChangeAspect="1"/>
+          </p:cNvPicPr>
+          <p:nvPr/>
+        </p:nvPicPr>
+        <p:blipFill>
+          <a:blip r:embed="rId2"/>
+          <a:stretch>
+            <a:fillRect/>
+          </a:stretch>
+        </p:blipFill>
+        <p:spPr>
+          <a:xfrm>
+            <a:off x="5780103" y="1098968"/>
+            <a:ext cx="1325563" cy="1325563"/>
+          </a:xfrm>
+          <a:prstGeom prst="rect">
+            <a:avLst/>
+          </a:prstGeom>
+        </p:spPr>
+      </p:pic>
+      <p:pic>
+        <p:nvPicPr>
+          <p:cNvPr id="7" name="Imagen 6">
+            <a:extLst>
+              <a:ext uri="{FF2B5EF4-FFF2-40B4-BE49-F238E27FC236}">
+                <a16:creationId xmlns:a16="http://schemas.microsoft.com/office/drawing/2014/main" id="{C9792E66-85BF-EE0E-ED33-1EC4428BC8C3}"/>
+              </a:ext>
+            </a:extLst>
+          </p:cNvPr>
+          <p:cNvPicPr>
+            <a:picLocks noChangeAspect="1"/>
+          </p:cNvPicPr>
+          <p:nvPr/>
+        </p:nvPicPr>
+        <p:blipFill>
+          <a:blip r:embed="rId3"/>
+          <a:stretch>
+            <a:fillRect/>
+          </a:stretch>
+        </p:blipFill>
+        <p:spPr>
+          <a:xfrm>
+            <a:off x="2573111" y="2710725"/>
+            <a:ext cx="1325563" cy="1325563"/>
+          </a:xfrm>
+          <a:prstGeom prst="rect">
+            <a:avLst/>
+          </a:prstGeom>
+        </p:spPr>
+      </p:pic>
+      <p:pic>
+        <p:nvPicPr>
+          <p:cNvPr id="8" name="Imagen 7">
+            <a:extLst>
+              <a:ext uri="{FF2B5EF4-FFF2-40B4-BE49-F238E27FC236}">
+                <a16:creationId xmlns:a16="http://schemas.microsoft.com/office/drawing/2014/main" id="{BB3B4684-49B2-6DC7-FEFB-5BDA92F07A30}"/>
+              </a:ext>
+            </a:extLst>
+          </p:cNvPr>
+          <p:cNvPicPr>
+            <a:picLocks noChangeAspect="1"/>
+          </p:cNvPicPr>
+          <p:nvPr/>
+        </p:nvPicPr>
+        <p:blipFill>
+          <a:blip r:embed="rId2"/>
+          <a:stretch>
+            <a:fillRect/>
+          </a:stretch>
+        </p:blipFill>
+        <p:spPr>
+          <a:xfrm>
+            <a:off x="5921282" y="4932042"/>
+            <a:ext cx="1254711" cy="1254711"/>
+          </a:xfrm>
+          <a:prstGeom prst="rect">
+            <a:avLst/>
+          </a:prstGeom>
+        </p:spPr>
+      </p:pic>
+      <p:pic>
+        <p:nvPicPr>
+          <p:cNvPr id="10" name="Imagen 9">
+            <a:extLst>
+              <a:ext uri="{FF2B5EF4-FFF2-40B4-BE49-F238E27FC236}">
+                <a16:creationId xmlns:a16="http://schemas.microsoft.com/office/drawing/2014/main" id="{02E2829D-AB36-75AC-FB4C-11BE5E7ACB8D}"/>
+              </a:ext>
+            </a:extLst>
+          </p:cNvPr>
+          <p:cNvPicPr>
+            <a:picLocks noChangeAspect="1"/>
+          </p:cNvPicPr>
+          <p:nvPr/>
+        </p:nvPicPr>
+        <p:blipFill>
+          <a:blip r:embed="rId4"/>
+          <a:stretch>
+            <a:fillRect/>
+          </a:stretch>
+        </p:blipFill>
+        <p:spPr>
+          <a:xfrm>
+            <a:off x="5885857" y="3154776"/>
+            <a:ext cx="1325563" cy="1325563"/>
+          </a:xfrm>
+          <a:prstGeom prst="rect">
+            <a:avLst/>
+          </a:prstGeom>
+        </p:spPr>
+      </p:pic>
+      <p:sp>
+        <p:nvSpPr>
+          <p:cNvPr id="15" name="CuadroTexto 14">
+            <a:extLst>
+              <a:ext uri="{FF2B5EF4-FFF2-40B4-BE49-F238E27FC236}">
+                <a16:creationId xmlns:a16="http://schemas.microsoft.com/office/drawing/2014/main" id="{F1F8DB62-1651-67B5-5BC5-D4E1E8D0F5E1}"/>
+              </a:ext>
+            </a:extLst>
+          </p:cNvPr>
+          <p:cNvSpPr txBox="1"/>
+          <p:nvPr/>
+        </p:nvSpPr>
+        <p:spPr>
+          <a:xfrm>
+            <a:off x="5763088" y="4519892"/>
+            <a:ext cx="2923836" cy="369332"/>
+          </a:xfrm>
+          <a:prstGeom prst="rect">
+            <a:avLst/>
+          </a:prstGeom>
+          <a:noFill/>
+        </p:spPr>
+        <p:txBody>
+          <a:bodyPr wrap="square" rtlCol="0">
+            <a:spAutoFit/>
+          </a:bodyPr>
+          <a:lstStyle/>
+          <a:p>
+            <a:r>
+              <a:rPr lang="es-419" sz="1800" dirty="0" err="1">
+                <a:hlinkClick r:id="rId5"/>
+              </a:rPr>
+              <a:t>casos_clinicos_diagnostico</a:t>
+            </a:r>
+            <a:endParaRPr lang="en-US" sz="1200" i="1" dirty="0"/>
+          </a:p>
+        </p:txBody>
+      </p:sp>
+      <p:sp>
+        <p:nvSpPr>
+          <p:cNvPr id="19" name="CuadroTexto 18">
+            <a:extLst>
+              <a:ext uri="{FF2B5EF4-FFF2-40B4-BE49-F238E27FC236}">
+                <a16:creationId xmlns:a16="http://schemas.microsoft.com/office/drawing/2014/main" id="{301BC45D-4762-9A49-139F-4D7491A5CF89}"/>
+              </a:ext>
+            </a:extLst>
+          </p:cNvPr>
+          <p:cNvSpPr txBox="1"/>
+          <p:nvPr/>
+        </p:nvSpPr>
+        <p:spPr>
+          <a:xfrm>
+            <a:off x="3060852" y="199452"/>
+            <a:ext cx="6067877" cy="400110"/>
+          </a:xfrm>
+          <a:prstGeom prst="rect">
+            <a:avLst/>
+          </a:prstGeom>
+          <a:noFill/>
+        </p:spPr>
+        <p:txBody>
+          <a:bodyPr wrap="square" rtlCol="0">
+            <a:spAutoFit/>
+          </a:bodyPr>
+          <a:lstStyle/>
+          <a:p>
+            <a:r>
+              <a:rPr lang="es-419" sz="2000" b="1" dirty="0"/>
+              <a:t>Proceso de entrenamiento para un autoajuste del LLM</a:t>
+            </a:r>
+            <a:endParaRPr lang="en-US" sz="2000" b="1" dirty="0"/>
+          </a:p>
+        </p:txBody>
+      </p:sp>
+      <p:sp>
+        <p:nvSpPr>
+          <p:cNvPr id="26" name="CuadroTexto 25">
+            <a:extLst>
+              <a:ext uri="{FF2B5EF4-FFF2-40B4-BE49-F238E27FC236}">
+                <a16:creationId xmlns:a16="http://schemas.microsoft.com/office/drawing/2014/main" id="{B10B70F9-6A6A-0FA0-A4A4-923CAF931B81}"/>
+              </a:ext>
+            </a:extLst>
+          </p:cNvPr>
+          <p:cNvSpPr txBox="1"/>
+          <p:nvPr/>
+        </p:nvSpPr>
+        <p:spPr>
+          <a:xfrm>
+            <a:off x="5751169" y="652779"/>
+            <a:ext cx="2376172" cy="369332"/>
+          </a:xfrm>
+          <a:prstGeom prst="rect">
+            <a:avLst/>
+          </a:prstGeom>
+          <a:noFill/>
+        </p:spPr>
+        <p:txBody>
+          <a:bodyPr wrap="square" rtlCol="0">
+            <a:spAutoFit/>
+          </a:bodyPr>
+          <a:lstStyle/>
+          <a:p>
+            <a:r>
+              <a:rPr lang="es-419" i="1" dirty="0"/>
+              <a:t>Conjunto de Datos</a:t>
+            </a:r>
+            <a:endParaRPr lang="en-US" i="1" dirty="0"/>
+          </a:p>
+        </p:txBody>
+      </p:sp>
+      <p:sp>
+        <p:nvSpPr>
+          <p:cNvPr id="29" name="CuadroTexto 28">
+            <a:extLst>
+              <a:ext uri="{FF2B5EF4-FFF2-40B4-BE49-F238E27FC236}">
+                <a16:creationId xmlns:a16="http://schemas.microsoft.com/office/drawing/2014/main" id="{335F2351-B878-8EDC-1FCA-9C6B99D8EA0C}"/>
+              </a:ext>
+            </a:extLst>
+          </p:cNvPr>
+          <p:cNvSpPr txBox="1"/>
+          <p:nvPr/>
+        </p:nvSpPr>
+        <p:spPr>
+          <a:xfrm>
+            <a:off x="5370990" y="6196883"/>
+            <a:ext cx="3414821" cy="492443"/>
+          </a:xfrm>
+          <a:prstGeom prst="rect">
+            <a:avLst/>
+          </a:prstGeom>
+          <a:noFill/>
+        </p:spPr>
+        <p:txBody>
+          <a:bodyPr wrap="square" rtlCol="0">
+            <a:spAutoFit/>
+          </a:bodyPr>
+          <a:lstStyle/>
+          <a:p>
+            <a:r>
+              <a:rPr lang="en-US" sz="1200" b="1" dirty="0"/>
+              <a:t>Exams to access a specialized position in the Spanish healthcare system </a:t>
+            </a:r>
+            <a:r>
+              <a:rPr lang="en-US" sz="1200" dirty="0"/>
+              <a:t>(</a:t>
+            </a:r>
+            <a:r>
+              <a:rPr lang="es-419" sz="1400" dirty="0" err="1">
+                <a:hlinkClick r:id="rId6"/>
+              </a:rPr>
+              <a:t>head_qa</a:t>
+            </a:r>
+            <a:r>
+              <a:rPr lang="en-US" sz="1200" dirty="0"/>
+              <a:t>)</a:t>
+            </a:r>
+            <a:endParaRPr lang="en-US" sz="1200" i="1" dirty="0"/>
+          </a:p>
+        </p:txBody>
+      </p:sp>
+      <p:sp>
+        <p:nvSpPr>
+          <p:cNvPr id="30" name="CuadroTexto 29">
+            <a:extLst>
+              <a:ext uri="{FF2B5EF4-FFF2-40B4-BE49-F238E27FC236}">
+                <a16:creationId xmlns:a16="http://schemas.microsoft.com/office/drawing/2014/main" id="{B3FAA69D-E61E-42B5-26B5-5F5C90BB8012}"/>
+              </a:ext>
+            </a:extLst>
+          </p:cNvPr>
+          <p:cNvSpPr txBox="1"/>
+          <p:nvPr/>
+        </p:nvSpPr>
+        <p:spPr>
+          <a:xfrm>
+            <a:off x="5654867" y="2500044"/>
+            <a:ext cx="2811348" cy="369332"/>
+          </a:xfrm>
+          <a:prstGeom prst="rect">
+            <a:avLst/>
+          </a:prstGeom>
+          <a:noFill/>
+        </p:spPr>
+        <p:txBody>
+          <a:bodyPr wrap="square" rtlCol="0">
+            <a:spAutoFit/>
+          </a:bodyPr>
+          <a:lstStyle/>
+          <a:p>
+            <a:r>
+              <a:rPr lang="es-419" sz="1800" dirty="0" err="1">
+                <a:hlinkClick r:id="rId7"/>
+              </a:rPr>
+              <a:t>casos_clinicos_tratamiento</a:t>
+            </a:r>
+            <a:endParaRPr lang="en-US" sz="1200" i="1" dirty="0"/>
+          </a:p>
+        </p:txBody>
+      </p:sp>
+      <p:sp>
+        <p:nvSpPr>
+          <p:cNvPr id="35" name="CuadroTexto 34">
+            <a:extLst>
+              <a:ext uri="{FF2B5EF4-FFF2-40B4-BE49-F238E27FC236}">
+                <a16:creationId xmlns:a16="http://schemas.microsoft.com/office/drawing/2014/main" id="{FC2FDD67-4E7E-880B-28BE-3B64321CCEC0}"/>
+              </a:ext>
+            </a:extLst>
+          </p:cNvPr>
+          <p:cNvSpPr txBox="1"/>
+          <p:nvPr/>
+        </p:nvSpPr>
+        <p:spPr>
+          <a:xfrm>
+            <a:off x="2228296" y="4136089"/>
+            <a:ext cx="2279090" cy="369332"/>
+          </a:xfrm>
+          <a:prstGeom prst="rect">
+            <a:avLst/>
+          </a:prstGeom>
+          <a:noFill/>
+        </p:spPr>
+        <p:txBody>
+          <a:bodyPr wrap="square" rtlCol="0">
+            <a:spAutoFit/>
+          </a:bodyPr>
+          <a:lstStyle/>
+          <a:p>
+            <a:r>
+              <a:rPr lang="es-419" b="1" i="1" dirty="0" err="1"/>
+              <a:t>SpanishMedicaLLM</a:t>
+            </a:r>
+            <a:endParaRPr lang="en-US" b="1" i="1" dirty="0"/>
+          </a:p>
+        </p:txBody>
+      </p:sp>
+      <p:sp>
+        <p:nvSpPr>
+          <p:cNvPr id="2" name="Flecha: a la derecha 1">
+            <a:extLst>
+              <a:ext uri="{FF2B5EF4-FFF2-40B4-BE49-F238E27FC236}">
+                <a16:creationId xmlns:a16="http://schemas.microsoft.com/office/drawing/2014/main" id="{20F63C10-CA9D-BAF7-BA02-EFC1C8B4C1C7}"/>
+              </a:ext>
+            </a:extLst>
+          </p:cNvPr>
+          <p:cNvSpPr/>
+          <p:nvPr/>
+        </p:nvSpPr>
+        <p:spPr>
+          <a:xfrm>
+            <a:off x="4296932" y="3343464"/>
+            <a:ext cx="710214" cy="177554"/>
+          </a:xfrm>
+          <a:prstGeom prst="rightArrow">
+            <a:avLst/>
+          </a:prstGeom>
+          <a:noFill/>
+        </p:spPr>
+        <p:style>
+          <a:lnRef idx="2">
+            <a:schemeClr val="accent1">
+              <a:shade val="15000"/>
+            </a:schemeClr>
+          </a:lnRef>
+          <a:fillRef idx="1">
+            <a:schemeClr val="accent1"/>
+          </a:fillRef>
+          <a:effectRef idx="0">
+            <a:schemeClr val="accent1"/>
+          </a:effectRef>
+          <a:fontRef idx="minor">
+            <a:schemeClr val="lt1"/>
+          </a:fontRef>
+        </p:style>
+        <p:txBody>
+          <a:bodyPr rtlCol="0" anchor="ctr"/>
+          <a:lstStyle/>
+          <a:p>
+            <a:pPr algn="ctr"/>
+            <a:endParaRPr lang="en-US" dirty="0"/>
+          </a:p>
+        </p:txBody>
+      </p:sp>
+      <p:sp>
+        <p:nvSpPr>
+          <p:cNvPr id="3" name="CuadroTexto 2">
+            <a:extLst>
+              <a:ext uri="{FF2B5EF4-FFF2-40B4-BE49-F238E27FC236}">
+                <a16:creationId xmlns:a16="http://schemas.microsoft.com/office/drawing/2014/main" id="{0E4FE265-364D-8F24-2CE8-AE2628057BAB}"/>
+              </a:ext>
+            </a:extLst>
+          </p:cNvPr>
+          <p:cNvSpPr txBox="1"/>
+          <p:nvPr/>
+        </p:nvSpPr>
+        <p:spPr>
+          <a:xfrm>
+            <a:off x="4258819" y="2737999"/>
+            <a:ext cx="1035902" cy="369332"/>
+          </a:xfrm>
+          <a:prstGeom prst="rect">
+            <a:avLst/>
+          </a:prstGeom>
+          <a:noFill/>
+        </p:spPr>
+        <p:txBody>
+          <a:bodyPr wrap="square" rtlCol="0">
+            <a:spAutoFit/>
+          </a:bodyPr>
+          <a:lstStyle/>
+          <a:p>
+            <a:r>
+              <a:rPr lang="es-419" dirty="0">
+                <a:solidFill>
+                  <a:srgbClr val="FF0000"/>
+                </a:solidFill>
+              </a:rPr>
+              <a:t>Evaluar</a:t>
+            </a:r>
+            <a:endParaRPr lang="en-US" dirty="0">
+              <a:solidFill>
+                <a:srgbClr val="FF0000"/>
+              </a:solidFill>
+            </a:endParaRPr>
+          </a:p>
+        </p:txBody>
+      </p:sp>
+      <p:sp>
+        <p:nvSpPr>
+          <p:cNvPr id="4" name="Flecha: a la derecha 3">
+            <a:extLst>
+              <a:ext uri="{FF2B5EF4-FFF2-40B4-BE49-F238E27FC236}">
+                <a16:creationId xmlns:a16="http://schemas.microsoft.com/office/drawing/2014/main" id="{45A3A474-25D0-4575-580A-30756C4EA5D4}"/>
+              </a:ext>
+            </a:extLst>
+          </p:cNvPr>
+          <p:cNvSpPr/>
+          <p:nvPr/>
+        </p:nvSpPr>
+        <p:spPr>
+          <a:xfrm rot="1431006" flipV="1">
+            <a:off x="7756001" y="1810068"/>
+            <a:ext cx="1041770" cy="187854"/>
+          </a:xfrm>
+          <a:prstGeom prst="rightArrow">
+            <a:avLst/>
+          </a:prstGeom>
+          <a:noFill/>
+        </p:spPr>
+        <p:style>
+          <a:lnRef idx="2">
+            <a:schemeClr val="accent1">
+              <a:shade val="15000"/>
+            </a:schemeClr>
+          </a:lnRef>
+          <a:fillRef idx="1">
+            <a:schemeClr val="accent1"/>
+          </a:fillRef>
+          <a:effectRef idx="0">
+            <a:schemeClr val="accent1"/>
+          </a:effectRef>
+          <a:fontRef idx="minor">
+            <a:schemeClr val="lt1"/>
+          </a:fontRef>
+        </p:style>
+        <p:txBody>
+          <a:bodyPr rtlCol="0" anchor="ctr"/>
+          <a:lstStyle/>
+          <a:p>
+            <a:pPr algn="ctr"/>
+            <a:endParaRPr lang="en-US" dirty="0"/>
+          </a:p>
+        </p:txBody>
+      </p:sp>
+      <p:sp>
+        <p:nvSpPr>
+          <p:cNvPr id="5" name="Flecha: a la derecha 4">
+            <a:extLst>
+              <a:ext uri="{FF2B5EF4-FFF2-40B4-BE49-F238E27FC236}">
+                <a16:creationId xmlns:a16="http://schemas.microsoft.com/office/drawing/2014/main" id="{5149F126-4871-141D-E3C9-01F6CA49F50B}"/>
+              </a:ext>
+            </a:extLst>
+          </p:cNvPr>
+          <p:cNvSpPr/>
+          <p:nvPr/>
+        </p:nvSpPr>
+        <p:spPr>
+          <a:xfrm flipV="1">
+            <a:off x="7744041" y="3628952"/>
+            <a:ext cx="1041770" cy="187854"/>
+          </a:xfrm>
+          <a:prstGeom prst="rightArrow">
+            <a:avLst/>
+          </a:prstGeom>
+          <a:noFill/>
+        </p:spPr>
+        <p:style>
+          <a:lnRef idx="2">
+            <a:schemeClr val="accent1">
+              <a:shade val="15000"/>
+            </a:schemeClr>
+          </a:lnRef>
+          <a:fillRef idx="1">
+            <a:schemeClr val="accent1"/>
+          </a:fillRef>
+          <a:effectRef idx="0">
+            <a:schemeClr val="accent1"/>
+          </a:effectRef>
+          <a:fontRef idx="minor">
+            <a:schemeClr val="lt1"/>
+          </a:fontRef>
+        </p:style>
+        <p:txBody>
+          <a:bodyPr rtlCol="0" anchor="ctr"/>
+          <a:lstStyle/>
+          <a:p>
+            <a:pPr algn="ctr"/>
+            <a:endParaRPr lang="en-US" dirty="0"/>
+          </a:p>
+        </p:txBody>
+      </p:sp>
+      <p:sp>
+        <p:nvSpPr>
+          <p:cNvPr id="9" name="Flecha: a la derecha 8">
+            <a:extLst>
+              <a:ext uri="{FF2B5EF4-FFF2-40B4-BE49-F238E27FC236}">
+                <a16:creationId xmlns:a16="http://schemas.microsoft.com/office/drawing/2014/main" id="{3A2D3513-79A3-DBB5-EC6B-089DC4E7DF91}"/>
+              </a:ext>
+            </a:extLst>
+          </p:cNvPr>
+          <p:cNvSpPr/>
+          <p:nvPr/>
+        </p:nvSpPr>
+        <p:spPr>
+          <a:xfrm rot="20024228" flipV="1">
+            <a:off x="8083877" y="5432505"/>
+            <a:ext cx="1041770" cy="187854"/>
+          </a:xfrm>
+          <a:prstGeom prst="rightArrow">
+            <a:avLst/>
+          </a:prstGeom>
+          <a:noFill/>
+        </p:spPr>
+        <p:style>
+          <a:lnRef idx="2">
+            <a:schemeClr val="accent1">
+              <a:shade val="15000"/>
+            </a:schemeClr>
+          </a:lnRef>
+          <a:fillRef idx="1">
+            <a:schemeClr val="accent1"/>
+          </a:fillRef>
+          <a:effectRef idx="0">
+            <a:schemeClr val="accent1"/>
+          </a:effectRef>
+          <a:fontRef idx="minor">
+            <a:schemeClr val="lt1"/>
+          </a:fontRef>
+        </p:style>
+        <p:txBody>
+          <a:bodyPr rtlCol="0" anchor="ctr"/>
+          <a:lstStyle/>
+          <a:p>
+            <a:pPr algn="ctr"/>
+            <a:endParaRPr lang="en-US" dirty="0"/>
+          </a:p>
+        </p:txBody>
+      </p:sp>
+      <p:sp>
+        <p:nvSpPr>
+          <p:cNvPr id="12" name="CuadroTexto 11">
+            <a:extLst>
+              <a:ext uri="{FF2B5EF4-FFF2-40B4-BE49-F238E27FC236}">
+                <a16:creationId xmlns:a16="http://schemas.microsoft.com/office/drawing/2014/main" id="{2814DD86-0783-DFCE-CBFB-2B1A5AF05E6C}"/>
+              </a:ext>
+            </a:extLst>
+          </p:cNvPr>
+          <p:cNvSpPr txBox="1"/>
+          <p:nvPr/>
+        </p:nvSpPr>
+        <p:spPr>
+          <a:xfrm>
+            <a:off x="9336516" y="1630003"/>
+            <a:ext cx="3065589" cy="1477328"/>
+          </a:xfrm>
+          <a:prstGeom prst="rect">
+            <a:avLst/>
+          </a:prstGeom>
+          <a:noFill/>
+        </p:spPr>
+        <p:txBody>
+          <a:bodyPr wrap="square" rtlCol="0">
+            <a:spAutoFit/>
+          </a:bodyPr>
+          <a:lstStyle/>
+          <a:p>
+            <a:r>
+              <a:rPr lang="es-419" dirty="0"/>
+              <a:t>Desempeño:</a:t>
+            </a:r>
+          </a:p>
+          <a:p>
+            <a:pPr marL="285750" indent="-285750">
+              <a:buFont typeface="Arial" panose="020B0604020202020204" pitchFamily="34" charset="0"/>
+              <a:buChar char="•"/>
+            </a:pPr>
+            <a:r>
+              <a:rPr lang="es-419" dirty="0" err="1"/>
+              <a:t>Accuracy</a:t>
+            </a:r>
+            <a:endParaRPr lang="es-419" dirty="0"/>
+          </a:p>
+          <a:p>
+            <a:pPr marL="285750" indent="-285750">
+              <a:buFont typeface="Arial" panose="020B0604020202020204" pitchFamily="34" charset="0"/>
+              <a:buChar char="•"/>
+            </a:pPr>
+            <a:r>
+              <a:rPr lang="es-419" dirty="0"/>
+              <a:t>F1-Macro</a:t>
+            </a:r>
+          </a:p>
+          <a:p>
+            <a:pPr marL="285750" indent="-285750">
+              <a:buFont typeface="Arial" panose="020B0604020202020204" pitchFamily="34" charset="0"/>
+              <a:buChar char="•"/>
+            </a:pPr>
+            <a:r>
+              <a:rPr lang="es-419" dirty="0"/>
+              <a:t>Otras para LLM en </a:t>
+            </a:r>
+          </a:p>
+          <a:p>
+            <a:r>
+              <a:rPr lang="es-419" dirty="0"/>
+              <a:t>contexto médico</a:t>
+            </a:r>
+            <a:endParaRPr lang="en-US" dirty="0"/>
+          </a:p>
+        </p:txBody>
+      </p:sp>
+      <p:pic>
+        <p:nvPicPr>
+          <p:cNvPr id="16" name="Imagen 15">
+            <a:extLst>
+              <a:ext uri="{FF2B5EF4-FFF2-40B4-BE49-F238E27FC236}">
+                <a16:creationId xmlns:a16="http://schemas.microsoft.com/office/drawing/2014/main" id="{60BEE8B7-C3C0-CB2D-775B-2F90A67E57CF}"/>
+              </a:ext>
+            </a:extLst>
+          </p:cNvPr>
+          <p:cNvPicPr>
+            <a:picLocks noChangeAspect="1"/>
+          </p:cNvPicPr>
+          <p:nvPr/>
+        </p:nvPicPr>
+        <p:blipFill>
+          <a:blip r:embed="rId8"/>
+          <a:stretch>
+            <a:fillRect/>
+          </a:stretch>
+        </p:blipFill>
+        <p:spPr>
+          <a:xfrm>
+            <a:off x="9421258" y="3316699"/>
+            <a:ext cx="2209733" cy="2209733"/>
+          </a:xfrm>
+          <a:prstGeom prst="rect">
+            <a:avLst/>
+          </a:prstGeom>
+        </p:spPr>
+      </p:pic>
+    </p:spTree>
+    <p:extLst>
+      <p:ext uri="{BB962C8B-B14F-4D97-AF65-F5344CB8AC3E}">
+        <p14:creationId xmlns:p14="http://schemas.microsoft.com/office/powerpoint/2010/main" val="3575179955"/>
+      </p:ext>
+    </p:extLst>
+  </p:cSld>
+  <p:clrMapOvr>
+    <a:masterClrMapping/>
+  </p:clrMapOvr>
+</p:sld>
+</file>
+
+<file path=ppt/slides/slide13.xml><?xml version="1.0" encoding="utf-8"?>
+<p:sld xmlns:a="http://schemas.openxmlformats.org/drawingml/2006/main" xmlns:r="http://schemas.openxmlformats.org/officeDocument/2006/relationships" xmlns:p="http://schemas.openxmlformats.org/presentationml/2006/main">
+  <p:cSld>
+    <p:spTree>
+      <p:nvGrpSpPr>
+        <p:cNvPr id="1" name=""/>
+        <p:cNvGrpSpPr/>
+        <p:nvPr/>
+      </p:nvGrpSpPr>
+      <p:grpSpPr>
+        <a:xfrm>
+          <a:off x="0" y="0"/>
+          <a:ext cx="0" cy="0"/>
+          <a:chOff x="0" y="0"/>
+          <a:chExt cx="0" cy="0"/>
+        </a:xfrm>
+      </p:grpSpPr>
       <p:sp>
         <p:nvSpPr>
           <p:cNvPr id="2" name="Título 1">
@@ -3582,6 +5500,20 @@
         <p:txBody>
           <a:bodyPr/>
           <a:lstStyle/>
+          <a:p>
+            <a:r>
+              <a:rPr lang="es-419" dirty="0"/>
+              <a:t> Medicas a emplear: </a:t>
+            </a:r>
+            <a:r>
+              <a:rPr lang="es-419" dirty="0" err="1"/>
+              <a:t>Accuracy</a:t>
+            </a:r>
+            <a:r>
+              <a:rPr lang="es-419" dirty="0"/>
+              <a:t>, F1-Macro</a:t>
+            </a:r>
+          </a:p>
           <a:p>
             <a:r>
               <a:rPr lang="es-419" dirty="0"/>
@@ -3759,7 +5691,7 @@
 </p:sld>
 </file>
 
-<file path=ppt/slides/slide12.xml><?xml version="1.0" encoding="utf-8"?>
+<file path=ppt/slides/slide14.xml><?xml version="1.0" encoding="utf-8"?>
 <p:sld xmlns:a="http://schemas.openxmlformats.org/drawingml/2006/main" xmlns:r="http://schemas.openxmlformats.org/officeDocument/2006/relationships" xmlns:p="http://schemas.openxmlformats.org/presentationml/2006/main">
   <p:cSld>
     <p:spTree>
@@ -4519,6 +6451,139 @@
           <a:chExt cx="0" cy="0"/>
         </a:xfrm>
       </p:grpSpPr>
+      <p:sp>
+        <p:nvSpPr>
+          <p:cNvPr id="2" name="Título 1">
+            <a:extLst>
+              <a:ext uri="{FF2B5EF4-FFF2-40B4-BE49-F238E27FC236}">
+                <a16:creationId xmlns:a16="http://schemas.microsoft.com/office/drawing/2014/main" id="{80B3D9FB-2BA0-B5CF-C544-63523CB56B21}"/>
+              </a:ext>
+            </a:extLst>
+          </p:cNvPr>
+          <p:cNvSpPr>
+            <a:spLocks noGrp="1"/>
+          </p:cNvSpPr>
+          <p:nvPr>
+            <p:ph type="title"/>
+          </p:nvPr>
+        </p:nvSpPr>
+        <p:spPr/>
+        <p:txBody>
+          <a:bodyPr/>
+          <a:lstStyle/>
+          <a:p>
+            <a:endParaRPr lang="en-US" dirty="0"/>
+          </a:p>
+        </p:txBody>
+      </p:sp>
+      <p:sp>
+        <p:nvSpPr>
+          <p:cNvPr id="3" name="Marcador de contenido 2">
+            <a:extLst>
+              <a:ext uri="{FF2B5EF4-FFF2-40B4-BE49-F238E27FC236}">
+                <a16:creationId xmlns:a16="http://schemas.microsoft.com/office/drawing/2014/main" id="{01074082-9F68-DD6B-A449-FD5DE2FA9036}"/>
+              </a:ext>
+            </a:extLst>
+          </p:cNvPr>
+          <p:cNvSpPr>
+            <a:spLocks noGrp="1"/>
+          </p:cNvSpPr>
+          <p:nvPr>
+            <p:ph idx="1"/>
+          </p:nvPr>
+        </p:nvSpPr>
+        <p:spPr/>
+        <p:txBody>
+          <a:bodyPr/>
+          <a:lstStyle/>
+          <a:p>
+            <a:r>
+              <a:rPr lang="es-419" dirty="0"/>
+              <a:t>Tener en cuenta los recursos listados en este articulo</a:t>
+            </a:r>
+          </a:p>
+          <a:p>
+            <a:pPr marL="0" indent="0">
+              <a:buNone/>
+            </a:pPr>
+            <a:r>
+              <a:rPr lang="es-419" dirty="0"/>
+              <a:t>   </a:t>
+            </a:r>
+            <a:r>
+              <a:rPr lang="es-419" dirty="0">
+                <a:hlinkClick r:id="rId2"/>
+              </a:rPr>
+              <a:t>https://github.com/PlanTL-GOB-ES/lm-biomedical-clinical-es?tab=readme-ov-file</a:t>
+            </a:r>
+            <a:endParaRPr lang="es-419" dirty="0"/>
+          </a:p>
+          <a:p>
+            <a:pPr marL="0" indent="0">
+              <a:buNone/>
+            </a:pPr>
+            <a:endParaRPr lang="es-419" dirty="0"/>
+          </a:p>
+          <a:p>
+            <a:pPr marL="0" indent="0">
+              <a:buNone/>
+            </a:pPr>
+            <a:r>
+              <a:rPr lang="es-419" dirty="0"/>
+              <a:t>    </a:t>
+            </a:r>
+            <a:r>
+              <a:rPr lang="es-419" dirty="0">
+                <a:hlinkClick r:id="rId3"/>
+              </a:rPr>
+              <a:t>https://digital.csic.es/bitstream/10261/270429/4/README.txt</a:t>
+            </a:r>
+            <a:endParaRPr lang="es-419" dirty="0"/>
+          </a:p>
+          <a:p>
+            <a:pPr marL="0" indent="0">
+              <a:buNone/>
+            </a:pPr>
+            <a:endParaRPr lang="es-419" dirty="0"/>
+          </a:p>
+          <a:p>
+            <a:pPr marL="0" indent="0">
+              <a:buNone/>
+            </a:pPr>
+            <a:endParaRPr lang="en-US" dirty="0"/>
+          </a:p>
+        </p:txBody>
+      </p:sp>
+    </p:spTree>
+    <p:extLst>
+      <p:ext uri="{BB962C8B-B14F-4D97-AF65-F5344CB8AC3E}">
+        <p14:creationId xmlns:p14="http://schemas.microsoft.com/office/powerpoint/2010/main" val="1079775897"/>
+      </p:ext>
+    </p:extLst>
+  </p:cSld>
+  <p:clrMapOvr>
+    <a:masterClrMapping/>
+  </p:clrMapOvr>
+</p:sld>
+</file>
+
+<file path=ppt/slides/slide6.xml><?xml version="1.0" encoding="utf-8"?>
+<p:sld xmlns:a="http://schemas.openxmlformats.org/drawingml/2006/main" xmlns:r="http://schemas.openxmlformats.org/officeDocument/2006/relationships" xmlns:p="http://schemas.openxmlformats.org/presentationml/2006/main">
+  <p:cSld>
+    <p:spTree>
+      <p:nvGrpSpPr>
+        <p:cNvPr id="1" name=""/>
+        <p:cNvGrpSpPr/>
+        <p:nvPr/>
+      </p:nvGrpSpPr>
+      <p:grpSpPr>
+        <a:xfrm>
+          <a:off x="0" y="0"/>
+          <a:ext cx="0" cy="0"/>
+          <a:chOff x="0" y="0"/>
+          <a:chExt cx="0" cy="0"/>
+        </a:xfrm>
+      </p:grpSpPr>
       <p:graphicFrame>
         <p:nvGraphicFramePr>
           <p:cNvPr id="4" name="Marcador de contenido 3">
@@ -4535,14 +6600,14 @@
             <p:ph idx="1"/>
             <p:extLst>
               <p:ext uri="{D42A27DB-BD31-4B8C-83A1-F6EECF244321}">
-                <p14:modId xmlns:p14="http://schemas.microsoft.com/office/powerpoint/2010/main" val="1041590390"/>
+                <p14:modId xmlns:p14="http://schemas.microsoft.com/office/powerpoint/2010/main" val="2496372367"/>
               </p:ext>
             </p:extLst>
           </p:nvPr>
         </p:nvGraphicFramePr>
         <p:xfrm>
-          <a:off x="1154097" y="1031239"/>
-          <a:ext cx="9357063" cy="5280780"/>
+          <a:off x="1012054" y="164856"/>
+          <a:ext cx="9357063" cy="21762720"/>
         </p:xfrm>
         <a:graphic>
           <a:graphicData uri="http://schemas.openxmlformats.org/drawingml/2006/table">
@@ -4580,7 +6645,7 @@
                   </a:extLst>
                 </a:gridCol>
               </a:tblGrid>
-              <a:tr h="440065">
+              <a:tr h="0">
                 <a:tc>
                   <a:txBody>
                     <a:bodyPr/>
@@ -4643,7 +6708,28 @@
                   </a:ext>
                 </a:extLst>
               </a:tr>
-              <a:tr h="440065">
+              <a:tr h="751265">
+                <a:tc>
+                  <a:txBody>
+                    <a:bodyPr/>
+                    <a:lstStyle/>
+                    <a:p>
+                      <a:r>
+                        <a:rPr lang="en-US" dirty="0"/>
+                        <a:t>Medical Lexicon for Spanish (</a:t>
+                      </a:r>
+                      <a:r>
+                        <a:rPr lang="en-US" dirty="0" err="1"/>
+                        <a:t>MedLexSp</a:t>
+                      </a:r>
+                      <a:r>
+                        <a:rPr lang="en-US" dirty="0"/>
+                        <a:t>)</a:t>
+                      </a:r>
+                    </a:p>
+                  </a:txBody>
+                  <a:tcPr/>
+                </a:tc>
                 <a:tc>
                   <a:txBody>
                     <a:bodyPr/>
@@ -4659,7 +6745,7 @@
                     <a:bodyPr/>
                     <a:lstStyle/>
                     <a:p>
-                      <a:endParaRPr lang="en-US" dirty="0"/>
+                      <a:endParaRPr lang="en-US"/>
                     </a:p>
                   </a:txBody>
                   <a:tcPr/>
@@ -4669,17 +6755,10 @@
                     <a:bodyPr/>
                     <a:lstStyle/>
                     <a:p>
-                      <a:endParaRPr lang="en-US"/>
-                    </a:p>
-                  </a:txBody>
-                  <a:tcPr/>
-                </a:tc>
-                <a:tc>
-                  <a:txBody>
-                    <a:bodyPr/>
-                    <a:lstStyle/>
-                    <a:p>
-                      <a:endParaRPr lang="en-US"/>
+                      <a:r>
+                        <a:rPr lang="en-US" dirty="0"/>
+                        <a:t>https://digital.csic.es/handle/10261/270429</a:t>
+                      </a:r>
                     </a:p>
                   </a:txBody>
                   <a:tcPr/>
@@ -4690,7 +6769,44 @@
                   </a:ext>
                 </a:extLst>
               </a:tr>
-              <a:tr h="440065">
+              <a:tr h="1427404">
+                <a:tc>
+                  <a:txBody>
+                    <a:bodyPr/>
+                    <a:lstStyle/>
+                    <a:p>
+                      <a:pPr marL="0" marR="0" lvl="0" indent="0" algn="l" defTabSz="914400" rtl="0" eaLnBrk="1" fontAlgn="auto" latinLnBrk="0" hangingPunct="1">
+                        <a:lnSpc>
+                          <a:spcPct val="100000"/>
+                        </a:lnSpc>
+                        <a:spcBef>
+                          <a:spcPts val="0"/>
+                        </a:spcBef>
+                        <a:spcAft>
+                          <a:spcPts val="0"/>
+                        </a:spcAft>
+                        <a:buClrTx/>
+                        <a:buSzTx/>
+                        <a:buFontTx/>
+                        <a:buNone/>
+                        <a:tabLst/>
+                        <a:defRPr/>
+                      </a:pPr>
+                      <a:r>
+                        <a:rPr lang="en-US" b="1" dirty="0" err="1"/>
+                        <a:t>CodiEsp</a:t>
+                      </a:r>
+                      <a:r>
+                        <a:rPr lang="en-US" b="1" dirty="0"/>
+                        <a:t> corpus: gold standard Spanish clinical cases coded in ICD10 (CIE10) - eHealth CLEF2020</a:t>
+                      </a:r>
+                    </a:p>
+                    <a:p>
+                      <a:endParaRPr lang="en-US" dirty="0"/>
+                    </a:p>
+                  </a:txBody>
+                  <a:tcPr/>
+                </a:tc>
                 <a:tc>
                   <a:txBody>
                     <a:bodyPr/>
@@ -4706,7 +6822,7 @@
                     <a:bodyPr/>
                     <a:lstStyle/>
                     <a:p>
-                      <a:endParaRPr lang="en-US"/>
+                      <a:endParaRPr lang="en-US" dirty="0"/>
                     </a:p>
                   </a:txBody>
                   <a:tcPr/>
@@ -4716,17 +6832,10 @@
                     <a:bodyPr/>
                     <a:lstStyle/>
                     <a:p>
-                      <a:endParaRPr lang="en-US"/>
-                    </a:p>
-                  </a:txBody>
-                  <a:tcPr/>
-                </a:tc>
-                <a:tc>
-                  <a:txBody>
-                    <a:bodyPr/>
-                    <a:lstStyle/>
-                    <a:p>
-                      <a:endParaRPr lang="en-US"/>
+                      <a:r>
+                        <a:rPr lang="en-US" dirty="0"/>
+                        <a:t>https://zenodo.org/records/3837305#.XsZFoXUzZpg</a:t>
+                      </a:r>
                     </a:p>
                   </a:txBody>
                   <a:tcPr/>
@@ -4737,13 +6846,40 @@
                   </a:ext>
                 </a:extLst>
               </a:tr>
-              <a:tr h="440065">
-                <a:tc>
-                  <a:txBody>
-                    <a:bodyPr/>
-                    <a:lstStyle/>
-                    <a:p>
-                      <a:endParaRPr lang="en-US"/>
+              <a:tr h="1878163">
+                <a:tc>
+                  <a:txBody>
+                    <a:bodyPr/>
+                    <a:lstStyle/>
+                    <a:p>
+                      <a:pPr marL="0" marR="0" lvl="0" indent="0" algn="l" defTabSz="914400" rtl="0" eaLnBrk="1" fontAlgn="auto" latinLnBrk="0" hangingPunct="1">
+                        <a:lnSpc>
+                          <a:spcPct val="100000"/>
+                        </a:lnSpc>
+                        <a:spcBef>
+                          <a:spcPts val="0"/>
+                        </a:spcBef>
+                        <a:spcAft>
+                          <a:spcPts val="0"/>
+                        </a:spcAft>
+                        <a:buClrTx/>
+                        <a:buSzTx/>
+                        <a:buFontTx/>
+                        <a:buNone/>
+                        <a:tabLst/>
+                        <a:defRPr/>
+                      </a:pPr>
+                      <a:r>
+                        <a:rPr lang="en-US" b="1" dirty="0" err="1"/>
+                        <a:t>Cantemist</a:t>
+                      </a:r>
+                      <a:r>
+                        <a:rPr lang="en-US" b="1" dirty="0"/>
+                        <a:t> corpus: gold standard of oncology clinical cases annotated with CIE-O 3 terminology</a:t>
+                      </a:r>
+                    </a:p>
+                    <a:p>
+                      <a:endParaRPr lang="en-US" dirty="0"/>
                     </a:p>
                   </a:txBody>
                   <a:tcPr/>
@@ -4753,7 +6889,7 @@
                     <a:bodyPr/>
                     <a:lstStyle/>
                     <a:p>
-                      <a:endParaRPr lang="en-US"/>
+                      <a:endParaRPr lang="en-US" dirty="0"/>
                     </a:p>
                   </a:txBody>
                   <a:tcPr/>
@@ -4763,7 +6899,7 @@
                     <a:bodyPr/>
                     <a:lstStyle/>
                     <a:p>
-                      <a:endParaRPr lang="en-US"/>
+                      <a:endParaRPr lang="en-US" dirty="0"/>
                     </a:p>
                   </a:txBody>
                   <a:tcPr/>
@@ -4773,7 +6909,29 @@
                     <a:bodyPr/>
                     <a:lstStyle/>
                     <a:p>
-                      <a:endParaRPr lang="en-US"/>
+                      <a:r>
+                        <a:rPr lang="en-US" dirty="0">
+                          <a:solidFill>
+                            <a:srgbClr val="FF0000"/>
+                          </a:solidFill>
+                        </a:rPr>
+                        <a:t>https://huggingface.co/datasets/PlanTL-GOB-ES/cantemist-ner</a:t>
+                      </a:r>
+                    </a:p>
+                    <a:p>
+                      <a:endParaRPr lang="en-US" dirty="0"/>
+                    </a:p>
+                    <a:p>
+                      <a:endParaRPr lang="en-US" dirty="0"/>
+                    </a:p>
+                    <a:p>
+                      <a:r>
+                        <a:rPr lang="en-US" dirty="0">
+                          <a:hlinkClick r:id="rId2"/>
+                        </a:rPr>
+                        <a:t>https://zenodo.org/records/3978041</a:t>
+                      </a:r>
+                      <a:endParaRPr lang="en-US" dirty="0"/>
                     </a:p>
                   </a:txBody>
                   <a:tcPr/>
@@ -4784,7 +6942,40 @@
                   </a:ext>
                 </a:extLst>
               </a:tr>
-              <a:tr h="440065">
+              <a:tr h="751265">
+                <a:tc>
+                  <a:txBody>
+                    <a:bodyPr/>
+                    <a:lstStyle/>
+                    <a:p>
+                      <a:pPr marL="0" marR="0" lvl="0" indent="0" algn="l" defTabSz="914400" rtl="0" eaLnBrk="1" fontAlgn="auto" latinLnBrk="0" hangingPunct="1">
+                        <a:lnSpc>
+                          <a:spcPct val="100000"/>
+                        </a:lnSpc>
+                        <a:spcBef>
+                          <a:spcPts val="0"/>
+                        </a:spcBef>
+                        <a:spcAft>
+                          <a:spcPts val="0"/>
+                        </a:spcAft>
+                        <a:buClrTx/>
+                        <a:buSzTx/>
+                        <a:buFontTx/>
+                        <a:buNone/>
+                        <a:tabLst/>
+                        <a:defRPr/>
+                      </a:pPr>
+                      <a:r>
+                        <a:rPr lang="en-US" b="1" dirty="0"/>
+                        <a:t>The Chilean Waiting List Corpus</a:t>
+                      </a:r>
+                    </a:p>
+                    <a:p>
+                      <a:endParaRPr lang="en-US" dirty="0"/>
+                    </a:p>
+                  </a:txBody>
+                  <a:tcPr/>
+                </a:tc>
                 <a:tc>
                   <a:txBody>
                     <a:bodyPr/>
@@ -4810,17 +7001,10 @@
                     <a:bodyPr/>
                     <a:lstStyle/>
                     <a:p>
-                      <a:endParaRPr lang="en-US"/>
-                    </a:p>
-                  </a:txBody>
-                  <a:tcPr/>
-                </a:tc>
-                <a:tc>
-                  <a:txBody>
-                    <a:bodyPr/>
-                    <a:lstStyle/>
-                    <a:p>
-                      <a:endParaRPr lang="en-US"/>
+                      <a:r>
+                        <a:rPr lang="en-US" dirty="0"/>
+                        <a:t>https://zenodo.org/records/7555181</a:t>
+                      </a:r>
                     </a:p>
                   </a:txBody>
                   <a:tcPr/>
@@ -4831,13 +7015,36 @@
                   </a:ext>
                 </a:extLst>
               </a:tr>
-              <a:tr h="440065">
-                <a:tc>
-                  <a:txBody>
-                    <a:bodyPr/>
-                    <a:lstStyle/>
-                    <a:p>
-                      <a:endParaRPr lang="en-US"/>
+              <a:tr h="1202024">
+                <a:tc>
+                  <a:txBody>
+                    <a:bodyPr/>
+                    <a:lstStyle/>
+                    <a:p>
+                      <a:pPr marL="0" marR="0" lvl="0" indent="0" algn="l" defTabSz="914400" rtl="0" eaLnBrk="1" fontAlgn="auto" latinLnBrk="0" hangingPunct="1">
+                        <a:lnSpc>
+                          <a:spcPct val="100000"/>
+                        </a:lnSpc>
+                        <a:spcBef>
+                          <a:spcPts val="0"/>
+                        </a:spcBef>
+                        <a:spcAft>
+                          <a:spcPts val="0"/>
+                        </a:spcAft>
+                        <a:buClrTx/>
+                        <a:buSzTx/>
+                        <a:buFontTx/>
+                        <a:buNone/>
+                        <a:tabLst/>
+                        <a:defRPr/>
+                      </a:pPr>
+                      <a:r>
+                        <a:rPr lang="en-US" b="1" dirty="0"/>
+                        <a:t>CT-EBM-SP - Corpus of Clinical Trials for Evidence-Based-Medicine in Spanish</a:t>
+                      </a:r>
+                    </a:p>
+                    <a:p>
+                      <a:endParaRPr lang="en-US" dirty="0"/>
                     </a:p>
                   </a:txBody>
                   <a:tcPr/>
@@ -4847,7 +7054,7 @@
                     <a:bodyPr/>
                     <a:lstStyle/>
                     <a:p>
-                      <a:endParaRPr lang="en-US"/>
+                      <a:endParaRPr lang="en-US" dirty="0"/>
                     </a:p>
                   </a:txBody>
                   <a:tcPr/>
@@ -4857,7 +7064,30 @@
                     <a:bodyPr/>
                     <a:lstStyle/>
                     <a:p>
-                      <a:endParaRPr lang="en-US"/>
+                      <a:pPr marL="0" marR="0" lvl="0" indent="0" algn="l" defTabSz="914400" rtl="0" eaLnBrk="1" fontAlgn="auto" latinLnBrk="0" hangingPunct="1">
+                        <a:lnSpc>
+                          <a:spcPct val="100000"/>
+                        </a:lnSpc>
+                        <a:spcBef>
+                          <a:spcPts val="0"/>
+                        </a:spcBef>
+                        <a:spcAft>
+                          <a:spcPts val="0"/>
+                        </a:spcAft>
+                        <a:buClrTx/>
+                        <a:buSzTx/>
+                        <a:buFontTx/>
+                        <a:buNone/>
+                        <a:tabLst/>
+                        <a:defRPr/>
+                      </a:pPr>
+                      <a:r>
+                        <a:rPr lang="en-US" dirty="0"/>
+                        <a:t>292 173</a:t>
+                      </a:r>
+                    </a:p>
+                    <a:p>
+                      <a:endParaRPr lang="en-US" dirty="0"/>
                     </a:p>
                   </a:txBody>
                   <a:tcPr/>
@@ -4867,7 +7097,10 @@
                     <a:bodyPr/>
                     <a:lstStyle/>
                     <a:p>
-                      <a:endParaRPr lang="en-US"/>
+                      <a:r>
+                        <a:rPr lang="en-US" dirty="0"/>
+                        <a:t>https://zenodo.org/records/6059737</a:t>
+                      </a:r>
                     </a:p>
                   </a:txBody>
                   <a:tcPr/>
@@ -4878,7 +7111,20 @@
                   </a:ext>
                 </a:extLst>
               </a:tr>
-              <a:tr h="440065">
+              <a:tr h="751265">
+                <a:tc>
+                  <a:txBody>
+                    <a:bodyPr/>
+                    <a:lstStyle/>
+                    <a:p>
+                      <a:r>
+                        <a:rPr lang="en-US" dirty="0"/>
+                        <a:t>MedlinePlus Spanish (National Library of Medicine, NLM)</a:t>
+                      </a:r>
+                    </a:p>
+                  </a:txBody>
+                  <a:tcPr/>
+                </a:tc>
                 <a:tc>
                   <a:txBody>
                     <a:bodyPr/>
@@ -4904,17 +7150,10 @@
                     <a:bodyPr/>
                     <a:lstStyle/>
                     <a:p>
-                      <a:endParaRPr lang="en-US"/>
-                    </a:p>
-                  </a:txBody>
-                  <a:tcPr/>
-                </a:tc>
-                <a:tc>
-                  <a:txBody>
-                    <a:bodyPr/>
-                    <a:lstStyle/>
-                    <a:p>
-                      <a:endParaRPr lang="en-US"/>
+                      <a:r>
+                        <a:rPr lang="en-US" dirty="0"/>
+                        <a:t>https://medlineplus.gov/spanish/</a:t>
+                      </a:r>
                     </a:p>
                   </a:txBody>
                   <a:tcPr/>
@@ -4925,7 +7164,96 @@
                   </a:ext>
                 </a:extLst>
               </a:tr>
-              <a:tr h="440065">
+              <a:tr h="1427404">
+                <a:tc>
+                  <a:txBody>
+                    <a:bodyPr/>
+                    <a:lstStyle/>
+                    <a:p>
+                      <a:r>
+                        <a:rPr lang="en-US" dirty="0" err="1"/>
+                        <a:t>PlanTL</a:t>
+                      </a:r>
+                      <a:r>
+                        <a:rPr lang="en-US" dirty="0"/>
+                        <a:t>-GOB-ES/</a:t>
+                      </a:r>
+                      <a:r>
+                        <a:rPr lang="en-US" dirty="0" err="1"/>
+                        <a:t>pharmaconer</a:t>
+                      </a:r>
+                      <a:r>
+                        <a:rPr lang="en-US" dirty="0"/>
+                        <a:t> (</a:t>
+                      </a:r>
+                      <a:r>
+                        <a:rPr lang="en-US" dirty="0" err="1"/>
+                        <a:t>Estudiar</a:t>
+                      </a:r>
+                      <a:r>
+                        <a:rPr lang="en-US" dirty="0"/>
+                        <a:t> </a:t>
+                      </a:r>
+                      <a:r>
+                        <a:rPr lang="en-US" dirty="0" err="1"/>
+                        <a:t>como</a:t>
+                      </a:r>
+                      <a:r>
+                        <a:rPr lang="en-US" dirty="0"/>
+                        <a:t> </a:t>
+                      </a:r>
+                      <a:r>
+                        <a:rPr lang="en-US" dirty="0" err="1"/>
+                        <a:t>llevar</a:t>
+                      </a:r>
+                      <a:r>
+                        <a:rPr lang="en-US" dirty="0"/>
+                        <a:t> a </a:t>
+                      </a:r>
+                      <a:r>
+                        <a:rPr lang="en-US" dirty="0" err="1"/>
+                        <a:t>formato</a:t>
+                      </a:r>
+                      <a:r>
+                        <a:rPr lang="en-US" dirty="0"/>
+                        <a:t> y </a:t>
+                      </a:r>
+                      <a:r>
+                        <a:rPr lang="en-US" dirty="0" err="1"/>
+                        <a:t>esta</a:t>
+                      </a:r>
+                      <a:r>
+                        <a:rPr lang="en-US" dirty="0"/>
+                        <a:t> </a:t>
+                      </a:r>
+                      <a:r>
+                        <a:rPr lang="en-US" dirty="0" err="1"/>
+                        <a:t>relacionado</a:t>
+                      </a:r>
+                      <a:r>
+                        <a:rPr lang="en-US" dirty="0"/>
+                        <a:t> con </a:t>
+                      </a:r>
+                      <a:r>
+                        <a:rPr lang="en-US" dirty="0" err="1"/>
+                        <a:t>el</a:t>
+                      </a:r>
+                      <a:r>
+                        <a:rPr lang="en-US" dirty="0"/>
+                        <a:t> de mas </a:t>
+                      </a:r>
+                      <a:r>
+                        <a:rPr lang="en-US" dirty="0" err="1"/>
+                        <a:t>abajo</a:t>
+                      </a:r>
+                      <a:r>
+                        <a:rPr lang="en-US" dirty="0"/>
+                        <a:t>)</a:t>
+                      </a:r>
+                    </a:p>
+                  </a:txBody>
+                  <a:tcPr/>
+                </a:tc>
                 <a:tc>
                   <a:txBody>
                     <a:bodyPr/>
@@ -4951,17 +7279,10 @@
                     <a:bodyPr/>
                     <a:lstStyle/>
                     <a:p>
-                      <a:endParaRPr lang="en-US" dirty="0"/>
-                    </a:p>
-                  </a:txBody>
-                  <a:tcPr/>
-                </a:tc>
-                <a:tc>
-                  <a:txBody>
-                    <a:bodyPr/>
-                    <a:lstStyle/>
-                    <a:p>
-                      <a:endParaRPr lang="en-US" dirty="0"/>
+                      <a:r>
+                        <a:rPr lang="en-US" dirty="0"/>
+                        <a:t>https://huggingface.co/datasets/PlanTL-GOB-ES/pharmaconer</a:t>
+                      </a:r>
                     </a:p>
                   </a:txBody>
                   <a:tcPr/>
@@ -4972,7 +7293,20 @@
                   </a:ext>
                 </a:extLst>
               </a:tr>
-              <a:tr h="440065">
+              <a:tr h="1427404">
+                <a:tc>
+                  <a:txBody>
+                    <a:bodyPr/>
+                    <a:lstStyle/>
+                    <a:p>
+                      <a:r>
+                        <a:rPr lang="en-US" dirty="0"/>
+                        <a:t>The Spanish Clinical Case Corpus (SPACCC)</a:t>
+                      </a:r>
+                    </a:p>
+                  </a:txBody>
+                  <a:tcPr/>
+                </a:tc>
                 <a:tc>
                   <a:txBody>
                     <a:bodyPr/>
@@ -4988,6 +7322,29 @@
                     <a:bodyPr/>
                     <a:lstStyle/>
                     <a:p>
+                      <a:pPr marL="0" marR="0" lvl="0" indent="0" algn="l" defTabSz="914400" rtl="0" eaLnBrk="1" fontAlgn="auto" latinLnBrk="0" hangingPunct="1">
+                        <a:lnSpc>
+                          <a:spcPct val="100000"/>
+                        </a:lnSpc>
+                        <a:spcBef>
+                          <a:spcPts val="0"/>
+                        </a:spcBef>
+                        <a:spcAft>
+                          <a:spcPts val="0"/>
+                        </a:spcAft>
+                        <a:buClrTx/>
+                        <a:buSzTx/>
+                        <a:buFontTx/>
+                        <a:buNone/>
+                        <a:tabLst/>
+                        <a:defRPr/>
+                      </a:pPr>
+                      <a:r>
+                        <a:rPr lang="en-US" dirty="0"/>
+                        <a:t>396,988</a:t>
+                      </a:r>
+                    </a:p>
+                    <a:p>
                       <a:endParaRPr lang="en-US" dirty="0"/>
                     </a:p>
                   </a:txBody>
@@ -4998,17 +7355,22 @@
                     <a:bodyPr/>
                     <a:lstStyle/>
                     <a:p>
+                      <a:r>
+                        <a:rPr lang="en-US" dirty="0">
+                          <a:hlinkClick r:id="rId3"/>
+                        </a:rPr>
+                        <a:t>https://zenodo.org/records/2560316</a:t>
+                      </a:r>
                       <a:endParaRPr lang="en-US" dirty="0"/>
                     </a:p>
-                  </a:txBody>
-                  <a:tcPr/>
-                </a:tc>
-                <a:tc>
-                  <a:txBody>
-                    <a:bodyPr/>
-                    <a:lstStyle/>
                     <a:p>
                       <a:endParaRPr lang="en-US" dirty="0"/>
+                    </a:p>
+                    <a:p>
+                      <a:r>
+                        <a:rPr lang="en-US" dirty="0"/>
+                        <a:t>https://github.com/PlanTL-GOB-ES/SPACCC</a:t>
+                      </a:r>
                     </a:p>
                   </a:txBody>
                   <a:tcPr/>
@@ -5019,12 +7381,29 @@
                   </a:ext>
                 </a:extLst>
               </a:tr>
-              <a:tr h="440065">
-                <a:tc>
-                  <a:txBody>
-                    <a:bodyPr/>
-                    <a:lstStyle/>
-                    <a:p>
+              <a:tr h="1427404">
+                <a:tc>
+                  <a:txBody>
+                    <a:bodyPr/>
+                    <a:lstStyle/>
+                    <a:p>
+                      <a:r>
+                        <a:rPr lang="en-US" dirty="0"/>
+                        <a:t>ORDO</a:t>
+                      </a:r>
+                    </a:p>
+                  </a:txBody>
+                  <a:tcPr/>
+                </a:tc>
+                <a:tc>
+                  <a:txBody>
+                    <a:bodyPr/>
+                    <a:lstStyle/>
+                    <a:p>
+                      <a:r>
+                        <a:rPr lang="es-419" dirty="0"/>
+                        <a:t>Estudiar como construir un recurso que se parezca a la base de datos</a:t>
+                      </a:r>
                       <a:endParaRPr lang="en-US" dirty="0"/>
                     </a:p>
                   </a:txBody>
@@ -5045,17 +7424,22 @@
                     <a:bodyPr/>
                     <a:lstStyle/>
                     <a:p>
+                      <a:r>
+                        <a:rPr lang="en-US" dirty="0">
+                          <a:hlinkClick r:id="rId4"/>
+                        </a:rPr>
+                        <a:t>https://www.orphadata.com/ordo/</a:t>
+                      </a:r>
                       <a:endParaRPr lang="en-US" dirty="0"/>
                     </a:p>
-                  </a:txBody>
-                  <a:tcPr/>
-                </a:tc>
-                <a:tc>
-                  <a:txBody>
-                    <a:bodyPr/>
-                    <a:lstStyle/>
                     <a:p>
                       <a:endParaRPr lang="en-US" dirty="0"/>
+                    </a:p>
+                    <a:p>
+                      <a:r>
+                        <a:rPr lang="en-US" dirty="0"/>
+                        <a:t>https://www.orphadata.com/docs/WhatIsORDO.pdf</a:t>
+                      </a:r>
                     </a:p>
                   </a:txBody>
                   <a:tcPr/>
@@ -5066,11 +7450,46 @@
                   </a:ext>
                 </a:extLst>
               </a:tr>
-              <a:tr h="440065">
-                <a:tc>
-                  <a:txBody>
-                    <a:bodyPr/>
-                    <a:lstStyle/>
+              <a:tr h="1427404">
+                <a:tc>
+                  <a:txBody>
+                    <a:bodyPr/>
+                    <a:lstStyle/>
+                    <a:p>
+                      <a:pPr marL="0" marR="0" lvl="0" indent="0" algn="l" defTabSz="914400" rtl="0" eaLnBrk="1" fontAlgn="auto" latinLnBrk="0" hangingPunct="1">
+                        <a:lnSpc>
+                          <a:spcPct val="100000"/>
+                        </a:lnSpc>
+                        <a:spcBef>
+                          <a:spcPts val="0"/>
+                        </a:spcBef>
+                        <a:spcAft>
+                          <a:spcPts val="0"/>
+                        </a:spcAft>
+                        <a:buClrTx/>
+                        <a:buSzTx/>
+                        <a:buFontTx/>
+                        <a:buNone/>
+                        <a:tabLst/>
+                        <a:defRPr/>
+                      </a:pPr>
+                      <a:r>
+                        <a:rPr lang="en-US" b="1" dirty="0" err="1"/>
+                        <a:t>DisTEMIST</a:t>
+                      </a:r>
+                      <a:r>
+                        <a:rPr lang="en-US" b="1" dirty="0"/>
+                        <a:t> corpus: detection and normalization of disease mentions in </a:t>
+                      </a:r>
+                      <a:r>
+                        <a:rPr lang="en-US" b="1" dirty="0" err="1"/>
+                        <a:t>spanish</a:t>
+                      </a:r>
+                      <a:r>
+                        <a:rPr lang="en-US" b="1" dirty="0"/>
+                        <a:t> clinical cases</a:t>
+                      </a:r>
+                    </a:p>
                     <a:p>
                       <a:endParaRPr lang="en-US" dirty="0"/>
                     </a:p>
@@ -5113,12 +7532,29 @@
                   </a:ext>
                 </a:extLst>
               </a:tr>
-              <a:tr h="440065">
-                <a:tc>
-                  <a:txBody>
-                    <a:bodyPr/>
-                    <a:lstStyle/>
-                    <a:p>
+              <a:tr h="751265">
+                <a:tc>
+                  <a:txBody>
+                    <a:bodyPr/>
+                    <a:lstStyle/>
+                    <a:p>
+                      <a:r>
+                        <a:rPr lang="en-US" dirty="0"/>
+                        <a:t>Spanish Drug Effect database</a:t>
+                      </a:r>
+                    </a:p>
+                  </a:txBody>
+                  <a:tcPr/>
+                </a:tc>
+                <a:tc>
+                  <a:txBody>
+                    <a:bodyPr/>
+                    <a:lstStyle/>
+                    <a:p>
+                      <a:r>
+                        <a:rPr lang="es-419" dirty="0"/>
+                        <a:t>Estudiar como utilizar pero puede servir para tratamientos</a:t>
+                      </a:r>
                       <a:endParaRPr lang="en-US" dirty="0"/>
                     </a:p>
                   </a:txBody>
@@ -5139,17 +7575,10 @@
                     <a:bodyPr/>
                     <a:lstStyle/>
                     <a:p>
-                      <a:endParaRPr lang="en-US" dirty="0"/>
-                    </a:p>
-                  </a:txBody>
-                  <a:tcPr/>
-                </a:tc>
-                <a:tc>
-                  <a:txBody>
-                    <a:bodyPr/>
-                    <a:lstStyle/>
-                    <a:p>
-                      <a:endParaRPr lang="en-US" dirty="0"/>
+                      <a:r>
+                        <a:rPr lang="en-US" dirty="0"/>
+                        <a:t>https://github.com/isegura/ADR</a:t>
+                      </a:r>
                     </a:p>
                   </a:txBody>
                   <a:tcPr/>
@@ -5157,6 +7586,306 @@
                 <a:extLst>
                   <a:ext uri="{0D108BD9-81ED-4DB2-BD59-A6C34878D82A}">
                     <a16:rowId xmlns:a16="http://schemas.microsoft.com/office/drawing/2014/main" val="1545824083"/>
+                  </a:ext>
+                </a:extLst>
+              </a:tr>
+              <a:tr h="976645">
+                <a:tc>
+                  <a:txBody>
+                    <a:bodyPr/>
+                    <a:lstStyle/>
+                    <a:p>
+                      <a:r>
+                        <a:rPr lang="en-US" dirty="0"/>
+                        <a:t>Unified Medical Language System (UMLS)</a:t>
+                      </a:r>
+                    </a:p>
+                  </a:txBody>
+                  <a:tcPr/>
+                </a:tc>
+                <a:tc>
+                  <a:txBody>
+                    <a:bodyPr/>
+                    <a:lstStyle/>
+                    <a:p>
+                      <a:pPr marL="0" marR="0" lvl="0" indent="0" algn="l" defTabSz="914400" rtl="0" eaLnBrk="1" fontAlgn="auto" latinLnBrk="0" hangingPunct="1">
+                        <a:lnSpc>
+                          <a:spcPct val="100000"/>
+                        </a:lnSpc>
+                        <a:spcBef>
+                          <a:spcPts val="0"/>
+                        </a:spcBef>
+                        <a:spcAft>
+                          <a:spcPts val="0"/>
+                        </a:spcAft>
+                        <a:buClrTx/>
+                        <a:buSzTx/>
+                        <a:buFontTx/>
+                        <a:buNone/>
+                        <a:tabLst/>
+                        <a:defRPr/>
+                      </a:pPr>
+                      <a:r>
+                        <a:rPr lang="es-419" dirty="0"/>
+                        <a:t>Estudiar como utilizar pero puede servir para tratamientos</a:t>
+                      </a:r>
+                      <a:endParaRPr lang="en-US" dirty="0"/>
+                    </a:p>
+                    <a:p>
+                      <a:endParaRPr lang="en-US" dirty="0"/>
+                    </a:p>
+                  </a:txBody>
+                  <a:tcPr/>
+                </a:tc>
+                <a:tc>
+                  <a:txBody>
+                    <a:bodyPr/>
+                    <a:lstStyle/>
+                    <a:p>
+                      <a:endParaRPr lang="en-US" dirty="0"/>
+                    </a:p>
+                  </a:txBody>
+                  <a:tcPr/>
+                </a:tc>
+                <a:tc>
+                  <a:txBody>
+                    <a:bodyPr/>
+                    <a:lstStyle/>
+                    <a:p>
+                      <a:r>
+                        <a:rPr lang="en-US" dirty="0"/>
+                        <a:t>https://www.nlm.nih.gov/research/umls/index.html</a:t>
+                      </a:r>
+                    </a:p>
+                  </a:txBody>
+                  <a:tcPr/>
+                </a:tc>
+                <a:extLst>
+                  <a:ext uri="{0D108BD9-81ED-4DB2-BD59-A6C34878D82A}">
+                    <a16:rowId xmlns:a16="http://schemas.microsoft.com/office/drawing/2014/main" val="3136521789"/>
+                  </a:ext>
+                </a:extLst>
+              </a:tr>
+              <a:tr h="1427404">
+                <a:tc>
+                  <a:txBody>
+                    <a:bodyPr/>
+                    <a:lstStyle/>
+                    <a:p>
+                      <a:pPr marL="0" marR="0" lvl="0" indent="0" algn="l" defTabSz="914400" rtl="0" eaLnBrk="1" fontAlgn="auto" latinLnBrk="0" hangingPunct="1">
+                        <a:lnSpc>
+                          <a:spcPct val="100000"/>
+                        </a:lnSpc>
+                        <a:spcBef>
+                          <a:spcPts val="0"/>
+                        </a:spcBef>
+                        <a:spcAft>
+                          <a:spcPts val="0"/>
+                        </a:spcAft>
+                        <a:buClrTx/>
+                        <a:buSzTx/>
+                        <a:buFontTx/>
+                        <a:buNone/>
+                        <a:tabLst/>
+                        <a:defRPr/>
+                      </a:pPr>
+                      <a:r>
+                        <a:rPr lang="en-US" b="1" dirty="0"/>
+                        <a:t>Spanish Biomedical Crawled Corpus</a:t>
+                      </a:r>
+                    </a:p>
+                    <a:p>
+                      <a:endParaRPr lang="en-US" dirty="0"/>
+                    </a:p>
+                  </a:txBody>
+                  <a:tcPr/>
+                </a:tc>
+                <a:tc>
+                  <a:txBody>
+                    <a:bodyPr/>
+                    <a:lstStyle/>
+                    <a:p>
+                      <a:r>
+                        <a:rPr lang="es-419" dirty="0"/>
+                        <a:t>En el texto tiene la descripción y la clasificación como enfermedad esto suena como un recurso a </a:t>
+                      </a:r>
+                      <a:r>
+                        <a:rPr lang="es-419" dirty="0" err="1"/>
+                        <a:t>prentrenar</a:t>
+                      </a:r>
+                      <a:endParaRPr lang="en-US" dirty="0"/>
+                    </a:p>
+                  </a:txBody>
+                  <a:tcPr/>
+                </a:tc>
+                <a:tc>
+                  <a:txBody>
+                    <a:bodyPr/>
+                    <a:lstStyle/>
+                    <a:p>
+                      <a:r>
+                        <a:rPr lang="es-419" dirty="0"/>
+                        <a:t>Grande</a:t>
+                      </a:r>
+                      <a:endParaRPr lang="en-US" dirty="0"/>
+                    </a:p>
+                  </a:txBody>
+                  <a:tcPr/>
+                </a:tc>
+                <a:tc>
+                  <a:txBody>
+                    <a:bodyPr/>
+                    <a:lstStyle/>
+                    <a:p>
+                      <a:r>
+                        <a:rPr lang="en-US" dirty="0"/>
+                        <a:t>https://zenodo.org/records/5513237#.Yp7lU_exWV4</a:t>
+                      </a:r>
+                    </a:p>
+                  </a:txBody>
+                  <a:tcPr/>
+                </a:tc>
+                <a:extLst>
+                  <a:ext uri="{0D108BD9-81ED-4DB2-BD59-A6C34878D82A}">
+                    <a16:rowId xmlns:a16="http://schemas.microsoft.com/office/drawing/2014/main" val="2557169691"/>
+                  </a:ext>
+                </a:extLst>
+              </a:tr>
+              <a:tr h="751265">
+                <a:tc>
+                  <a:txBody>
+                    <a:bodyPr/>
+                    <a:lstStyle/>
+                    <a:p>
+                      <a:pPr marL="0" marR="0" lvl="0" indent="0" algn="l" defTabSz="914400" rtl="0" eaLnBrk="1" fontAlgn="auto" latinLnBrk="0" hangingPunct="1">
+                        <a:lnSpc>
+                          <a:spcPct val="100000"/>
+                        </a:lnSpc>
+                        <a:spcBef>
+                          <a:spcPts val="0"/>
+                        </a:spcBef>
+                        <a:spcAft>
+                          <a:spcPts val="0"/>
+                        </a:spcAft>
+                        <a:buClrTx/>
+                        <a:buSzTx/>
+                        <a:buFontTx/>
+                        <a:buNone/>
+                        <a:tabLst/>
+                        <a:defRPr/>
+                      </a:pPr>
+                      <a:r>
+                        <a:rPr lang="en-US" b="1" dirty="0" err="1"/>
+                        <a:t>MeSpEn_Parallel</a:t>
+                      </a:r>
+                      <a:r>
+                        <a:rPr lang="en-US" b="1" dirty="0"/>
+                        <a:t>-Corpora</a:t>
+                      </a:r>
+                    </a:p>
+                    <a:p>
+                      <a:endParaRPr lang="en-US" dirty="0"/>
+                    </a:p>
+                  </a:txBody>
+                  <a:tcPr/>
+                </a:tc>
+                <a:tc>
+                  <a:txBody>
+                    <a:bodyPr/>
+                    <a:lstStyle/>
+                    <a:p>
+                      <a:endParaRPr lang="en-US" dirty="0"/>
+                    </a:p>
+                  </a:txBody>
+                  <a:tcPr/>
+                </a:tc>
+                <a:tc>
+                  <a:txBody>
+                    <a:bodyPr/>
+                    <a:lstStyle/>
+                    <a:p>
+                      <a:endParaRPr lang="en-US" dirty="0"/>
+                    </a:p>
+                  </a:txBody>
+                  <a:tcPr/>
+                </a:tc>
+                <a:tc>
+                  <a:txBody>
+                    <a:bodyPr/>
+                    <a:lstStyle/>
+                    <a:p>
+                      <a:r>
+                        <a:rPr lang="en-US" dirty="0"/>
+                        <a:t>https://zenodo.org/records/3562536#.YlP1UshBwio</a:t>
+                      </a:r>
+                    </a:p>
+                  </a:txBody>
+                  <a:tcPr/>
+                </a:tc>
+                <a:extLst>
+                  <a:ext uri="{0D108BD9-81ED-4DB2-BD59-A6C34878D82A}">
+                    <a16:rowId xmlns:a16="http://schemas.microsoft.com/office/drawing/2014/main" val="927172249"/>
+                  </a:ext>
+                </a:extLst>
+              </a:tr>
+              <a:tr h="1202024">
+                <a:tc>
+                  <a:txBody>
+                    <a:bodyPr/>
+                    <a:lstStyle/>
+                    <a:p>
+                      <a:endParaRPr lang="en-US" dirty="0">
+                        <a:effectLst/>
+                      </a:endParaRPr>
+                    </a:p>
+                    <a:p>
+                      <a:r>
+                        <a:rPr lang="en-US" b="1" dirty="0"/>
+                        <a:t>European Clinical Case Corpus </a:t>
+                      </a:r>
+                    </a:p>
+                    <a:p>
+                      <a:endParaRPr lang="en-US" dirty="0"/>
+                    </a:p>
+                  </a:txBody>
+                  <a:tcPr/>
+                </a:tc>
+                <a:tc>
+                  <a:txBody>
+                    <a:bodyPr/>
+                    <a:lstStyle/>
+                    <a:p>
+                      <a:endParaRPr lang="en-US" dirty="0"/>
+                    </a:p>
+                  </a:txBody>
+                  <a:tcPr/>
+                </a:tc>
+                <a:tc>
+                  <a:txBody>
+                    <a:bodyPr/>
+                    <a:lstStyle/>
+                    <a:p>
+                      <a:endParaRPr lang="en-US" dirty="0"/>
+                    </a:p>
+                  </a:txBody>
+                  <a:tcPr/>
+                </a:tc>
+                <a:tc>
+                  <a:txBody>
+                    <a:bodyPr/>
+                    <a:lstStyle/>
+                    <a:p>
+                      <a:r>
+                        <a:rPr lang="en-US" dirty="0"/>
+                        <a:t>https://live.european-language-grid.eu/catalogue/corpus/7618/download/</a:t>
+                      </a:r>
+                    </a:p>
+                  </a:txBody>
+                  <a:tcPr/>
+                </a:tc>
+                <a:extLst>
+                  <a:ext uri="{0D108BD9-81ED-4DB2-BD59-A6C34878D82A}">
+                    <a16:rowId xmlns:a16="http://schemas.microsoft.com/office/drawing/2014/main" val="3836850072"/>
                   </a:ext>
                 </a:extLst>
               </a:tr>
@@ -5168,355 +7897,6 @@
     <p:extLst>
       <p:ext uri="{BB962C8B-B14F-4D97-AF65-F5344CB8AC3E}">
         <p14:creationId xmlns:p14="http://schemas.microsoft.com/office/powerpoint/2010/main" val="1986512859"/>
-      </p:ext>
-    </p:extLst>
-  </p:cSld>
-  <p:clrMapOvr>
-    <a:masterClrMapping/>
-  </p:clrMapOvr>
-</p:sld>
-</file>
-
-<file path=ppt/slides/slide6.xml><?xml version="1.0" encoding="utf-8"?>
-<p:sld xmlns:a="http://schemas.openxmlformats.org/drawingml/2006/main" xmlns:r="http://schemas.openxmlformats.org/officeDocument/2006/relationships" xmlns:p="http://schemas.openxmlformats.org/presentationml/2006/main">
-  <p:cSld>
-    <p:spTree>
-      <p:nvGrpSpPr>
-        <p:cNvPr id="1" name=""/>
-        <p:cNvGrpSpPr/>
-        <p:nvPr/>
-      </p:nvGrpSpPr>
-      <p:grpSpPr>
-        <a:xfrm>
-          <a:off x="0" y="0"/>
-          <a:ext cx="0" cy="0"/>
-          <a:chOff x="0" y="0"/>
-          <a:chExt cx="0" cy="0"/>
-        </a:xfrm>
-      </p:grpSpPr>
-      <p:sp>
-        <p:nvSpPr>
-          <p:cNvPr id="2" name="Título 1">
-            <a:extLst>
-              <a:ext uri="{FF2B5EF4-FFF2-40B4-BE49-F238E27FC236}">
-                <a16:creationId xmlns:a16="http://schemas.microsoft.com/office/drawing/2014/main" id="{0C152B7D-1371-F1B2-AD1B-C576042E7C2B}"/>
-              </a:ext>
-            </a:extLst>
-          </p:cNvPr>
-          <p:cNvSpPr>
-            <a:spLocks noGrp="1"/>
-          </p:cNvSpPr>
-          <p:nvPr>
-            <p:ph type="title"/>
-          </p:nvPr>
-        </p:nvSpPr>
-        <p:spPr>
-          <a:xfrm>
-            <a:off x="838200" y="507168"/>
-            <a:ext cx="10515600" cy="709073"/>
-          </a:xfrm>
-        </p:spPr>
-        <p:txBody>
-          <a:bodyPr>
-            <a:normAutofit fontScale="90000"/>
-          </a:bodyPr>
-          <a:lstStyle/>
-          <a:p>
-            <a:r>
-              <a:rPr lang="es-419" b="1" dirty="0"/>
-              <a:t>Hipótesis para el autoajuste del modelo</a:t>
-            </a:r>
-            <a:br>
-              <a:rPr lang="es-419" b="1" dirty="0"/>
-            </a:br>
-            <a:endParaRPr lang="en-US" b="1" dirty="0"/>
-          </a:p>
-        </p:txBody>
-      </p:sp>
-      <p:sp>
-        <p:nvSpPr>
-          <p:cNvPr id="3" name="Marcador de contenido 2">
-            <a:extLst>
-              <a:ext uri="{FF2B5EF4-FFF2-40B4-BE49-F238E27FC236}">
-                <a16:creationId xmlns:a16="http://schemas.microsoft.com/office/drawing/2014/main" id="{5E0735EC-6B0B-DDA9-0422-F07CF8264683}"/>
-              </a:ext>
-            </a:extLst>
-          </p:cNvPr>
-          <p:cNvSpPr>
-            <a:spLocks noGrp="1"/>
-          </p:cNvSpPr>
-          <p:nvPr>
-            <p:ph idx="1"/>
-          </p:nvPr>
-        </p:nvSpPr>
-        <p:spPr>
-          <a:xfrm>
-            <a:off x="381740" y="1216240"/>
-            <a:ext cx="11354540" cy="5539667"/>
-          </a:xfrm>
-        </p:spPr>
-        <p:txBody>
-          <a:bodyPr>
-            <a:normAutofit fontScale="55000" lnSpcReduction="20000"/>
-          </a:bodyPr>
-          <a:lstStyle/>
-          <a:p>
-            <a:r>
-              <a:rPr lang="es-419" sz="4400" dirty="0"/>
-              <a:t> </a:t>
-            </a:r>
-            <a:r>
-              <a:rPr lang="es-419" sz="4400" dirty="0" err="1"/>
-              <a:t>Hipotesis</a:t>
-            </a:r>
-            <a:r>
-              <a:rPr lang="es-419" sz="4400" dirty="0"/>
-              <a:t> u Objetivo General:</a:t>
-            </a:r>
-          </a:p>
-          <a:p>
-            <a:pPr marL="0" indent="0" algn="just">
-              <a:buNone/>
-            </a:pPr>
-            <a:r>
-              <a:rPr lang="es-419" sz="4400" dirty="0"/>
-              <a:t>El autoajuste de un modelo LLM fundacional (</a:t>
-            </a:r>
-            <a:r>
-              <a:rPr lang="es-419" sz="4400" dirty="0" err="1"/>
-              <a:t>e.d</a:t>
-            </a:r>
-            <a:r>
-              <a:rPr lang="es-419" sz="4400" dirty="0"/>
-              <a:t> Llama2, Falcon , </a:t>
-            </a:r>
-            <a:r>
-              <a:rPr lang="es-419" sz="4400" dirty="0" err="1"/>
-              <a:t>BioMistral</a:t>
-            </a:r>
-            <a:r>
-              <a:rPr lang="es-419" sz="4400" dirty="0"/>
-              <a:t>, </a:t>
-            </a:r>
-            <a:r>
-              <a:rPr lang="es-419" sz="4400" dirty="0" err="1"/>
-              <a:t>Meditron</a:t>
-            </a:r>
-            <a:r>
-              <a:rPr lang="es-419" sz="4400" dirty="0"/>
-              <a:t>) con un alto grado o completamente </a:t>
-            </a:r>
-            <a:r>
-              <a:rPr lang="es-419" sz="4400" dirty="0" err="1"/>
-              <a:t>pre-entrenado</a:t>
-            </a:r>
-            <a:r>
-              <a:rPr lang="es-419" sz="4400" dirty="0"/>
-              <a:t> con textos en español, para datos de entrenamiento médico dará buenos resultados si:</a:t>
-            </a:r>
-          </a:p>
-          <a:p>
-            <a:pPr>
-              <a:buFont typeface="Wingdings" panose="05000000000000000000" pitchFamily="2" charset="2"/>
-              <a:buChar char="ü"/>
-            </a:pPr>
-            <a:r>
-              <a:rPr lang="es-419" sz="3300" dirty="0"/>
-              <a:t> Se usa la técnica de </a:t>
-            </a:r>
-            <a:r>
-              <a:rPr lang="es-419" sz="3300" dirty="0" err="1"/>
-              <a:t>Qlora</a:t>
-            </a:r>
-            <a:r>
-              <a:rPr lang="es-419" sz="3300" dirty="0"/>
-              <a:t> permitirá mantener el desempeño y el costo del modelo (</a:t>
-            </a:r>
-            <a:r>
-              <a:rPr lang="es-419" sz="3300" dirty="0" err="1"/>
-              <a:t>e.d</a:t>
-            </a:r>
-            <a:r>
-              <a:rPr lang="es-419" sz="3300" dirty="0"/>
-              <a:t> memoria, velocidad de respuesta, </a:t>
-            </a:r>
-            <a:r>
-              <a:rPr lang="es-419" sz="3300" dirty="0" err="1"/>
-              <a:t>etc</a:t>
-            </a:r>
-            <a:r>
-              <a:rPr lang="es-419" sz="3300" dirty="0"/>
-              <a:t>)</a:t>
-            </a:r>
-          </a:p>
-          <a:p>
-            <a:pPr>
-              <a:buFont typeface="Wingdings" panose="05000000000000000000" pitchFamily="2" charset="2"/>
-              <a:buChar char="ü"/>
-            </a:pPr>
-            <a:endParaRPr lang="es-419" sz="3300" dirty="0"/>
-          </a:p>
-          <a:p>
-            <a:pPr>
-              <a:buFont typeface="Wingdings" panose="05000000000000000000" pitchFamily="2" charset="2"/>
-              <a:buChar char="ü"/>
-            </a:pPr>
-            <a:r>
-              <a:rPr lang="es-419" sz="3300" dirty="0"/>
-              <a:t>Se usa la estrategia mezclado (</a:t>
-            </a:r>
-            <a:r>
-              <a:rPr lang="es-419" sz="3300" dirty="0" err="1"/>
-              <a:t>mixed</a:t>
-            </a:r>
-            <a:r>
-              <a:rPr lang="es-419" sz="3300" dirty="0"/>
-              <a:t>) de </a:t>
-            </a:r>
-            <a:r>
-              <a:rPr lang="es-419" sz="3300" dirty="0" err="1"/>
-              <a:t>BioMistral</a:t>
-            </a:r>
-            <a:r>
-              <a:rPr lang="es-419" sz="3300" dirty="0"/>
-              <a:t> propuesto en el trabajo “</a:t>
-            </a:r>
-            <a:r>
-              <a:rPr lang="en-US" sz="3300" dirty="0" err="1"/>
-              <a:t>BioMistral</a:t>
-            </a:r>
-            <a:r>
-              <a:rPr lang="en-US" sz="3300" dirty="0"/>
-              <a:t>: A Collection of Open-Source Pretrained Large Language Models for Medical Domains</a:t>
-            </a:r>
-            <a:r>
-              <a:rPr lang="es-419" sz="3300" dirty="0"/>
-              <a:t>” dará mejores resultados en el desempeño del modelo</a:t>
-            </a:r>
-          </a:p>
-          <a:p>
-            <a:pPr>
-              <a:buFont typeface="Wingdings" panose="05000000000000000000" pitchFamily="2" charset="2"/>
-              <a:buChar char="ü"/>
-            </a:pPr>
-            <a:endParaRPr lang="es-419" sz="3300" dirty="0"/>
-          </a:p>
-          <a:p>
-            <a:pPr>
-              <a:buFont typeface="Wingdings" panose="05000000000000000000" pitchFamily="2" charset="2"/>
-              <a:buChar char="ü"/>
-            </a:pPr>
-            <a:r>
-              <a:rPr lang="es-419" sz="3300" dirty="0"/>
-              <a:t>Si se usa la estrategia  de replay (Aprendizaje Continuo) usado en </a:t>
-            </a:r>
-            <a:r>
-              <a:rPr lang="es-419" sz="3300" dirty="0" err="1"/>
-              <a:t>Meditron</a:t>
-            </a:r>
-            <a:r>
-              <a:rPr lang="es-419" sz="3300" dirty="0"/>
-              <a:t> en el trabajo “</a:t>
-            </a:r>
-            <a:r>
-              <a:rPr lang="en-US" sz="3300" dirty="0"/>
-              <a:t>Meditron-70b: Scaling medical pretraining for large language models</a:t>
-            </a:r>
-            <a:r>
-              <a:rPr lang="es-419" sz="3300" dirty="0"/>
-              <a:t>”</a:t>
-            </a:r>
-          </a:p>
-          <a:p>
-            <a:pPr>
-              <a:buFont typeface="Wingdings" panose="05000000000000000000" pitchFamily="2" charset="2"/>
-              <a:buChar char="ü"/>
-            </a:pPr>
-            <a:endParaRPr lang="es-419" sz="3300" dirty="0"/>
-          </a:p>
-          <a:p>
-            <a:pPr>
-              <a:buFont typeface="Wingdings" panose="05000000000000000000" pitchFamily="2" charset="2"/>
-              <a:buChar char="ü"/>
-            </a:pPr>
-            <a:r>
-              <a:rPr lang="es-419" sz="3300" dirty="0"/>
-              <a:t>El uso de estrategia como </a:t>
-            </a:r>
-            <a:r>
-              <a:rPr lang="en-US" sz="3300" b="1" dirty="0"/>
-              <a:t>Direct Preference Optimization (DPO) </a:t>
-            </a:r>
-            <a:r>
-              <a:rPr lang="en-US" sz="3300" dirty="0" err="1"/>
-              <a:t>permite</a:t>
-            </a:r>
-            <a:r>
-              <a:rPr lang="en-US" sz="3300" dirty="0"/>
-              <a:t> </a:t>
-            </a:r>
-            <a:r>
-              <a:rPr lang="en-US" sz="3300" dirty="0" err="1"/>
-              <a:t>mejorar</a:t>
-            </a:r>
-            <a:r>
-              <a:rPr lang="en-US" sz="3300" dirty="0"/>
-              <a:t> </a:t>
-            </a:r>
-            <a:r>
-              <a:rPr lang="en-US" sz="3300" dirty="0" err="1"/>
-              <a:t>el</a:t>
-            </a:r>
-            <a:r>
-              <a:rPr lang="en-US" sz="3300" dirty="0"/>
-              <a:t> </a:t>
-            </a:r>
-            <a:r>
-              <a:rPr lang="en-US" sz="3300" dirty="0" err="1"/>
-              <a:t>desempeño</a:t>
-            </a:r>
-            <a:r>
-              <a:rPr lang="en-US" sz="3300" dirty="0"/>
-              <a:t> sin usar RLHF</a:t>
-            </a:r>
-          </a:p>
-          <a:p>
-            <a:pPr>
-              <a:buFont typeface="Wingdings" panose="05000000000000000000" pitchFamily="2" charset="2"/>
-              <a:buChar char="ü"/>
-            </a:pPr>
-            <a:endParaRPr lang="es-419" sz="3300" dirty="0"/>
-          </a:p>
-          <a:p>
-            <a:pPr>
-              <a:buFont typeface="Wingdings" panose="05000000000000000000" pitchFamily="2" charset="2"/>
-              <a:buChar char="ü"/>
-            </a:pPr>
-            <a:r>
-              <a:rPr lang="es-419" sz="3300" dirty="0"/>
-              <a:t>El uso en al autoajuste de fuentes de medicina tradicional y natural permitirá generar resultados o soluciones a problemas médicos más accesibles a los usuarios</a:t>
-            </a:r>
-          </a:p>
-          <a:p>
-            <a:pPr lvl="1">
-              <a:buFont typeface="Courier New" panose="02070309020205020404" pitchFamily="49" charset="0"/>
-              <a:buChar char="o"/>
-            </a:pPr>
-            <a:r>
-              <a:rPr lang="es-419" sz="3300" dirty="0"/>
-              <a:t>Puede obtenerse con una estrategia </a:t>
-            </a:r>
-            <a:r>
-              <a:rPr lang="en-US" sz="3300" dirty="0"/>
-              <a:t>Retrieval Augmented Generation (RAG)</a:t>
-            </a:r>
-          </a:p>
-        </p:txBody>
-      </p:sp>
-    </p:spTree>
-    <p:extLst>
-      <p:ext uri="{BB962C8B-B14F-4D97-AF65-F5344CB8AC3E}">
-        <p14:creationId xmlns:p14="http://schemas.microsoft.com/office/powerpoint/2010/main" val="144997341"/>
       </p:ext>
     </p:extLst>
   </p:cSld>
@@ -5548,6 +7928,359 @@
           <p:cNvPr id="2" name="Título 1">
             <a:extLst>
               <a:ext uri="{FF2B5EF4-FFF2-40B4-BE49-F238E27FC236}">
+                <a16:creationId xmlns:a16="http://schemas.microsoft.com/office/drawing/2014/main" id="{0C152B7D-1371-F1B2-AD1B-C576042E7C2B}"/>
+              </a:ext>
+            </a:extLst>
+          </p:cNvPr>
+          <p:cNvSpPr>
+            <a:spLocks noGrp="1"/>
+          </p:cNvSpPr>
+          <p:nvPr>
+            <p:ph type="title"/>
+          </p:nvPr>
+        </p:nvSpPr>
+        <p:spPr>
+          <a:xfrm>
+            <a:off x="838200" y="507168"/>
+            <a:ext cx="10515600" cy="709073"/>
+          </a:xfrm>
+        </p:spPr>
+        <p:txBody>
+          <a:bodyPr>
+            <a:normAutofit fontScale="90000"/>
+          </a:bodyPr>
+          <a:lstStyle/>
+          <a:p>
+            <a:r>
+              <a:rPr lang="es-419" b="1" dirty="0"/>
+              <a:t>Hipótesis para el autoajuste del modelo</a:t>
+            </a:r>
+            <a:br>
+              <a:rPr lang="es-419" b="1" dirty="0"/>
+            </a:br>
+            <a:endParaRPr lang="en-US" b="1" dirty="0"/>
+          </a:p>
+        </p:txBody>
+      </p:sp>
+      <p:sp>
+        <p:nvSpPr>
+          <p:cNvPr id="3" name="Marcador de contenido 2">
+            <a:extLst>
+              <a:ext uri="{FF2B5EF4-FFF2-40B4-BE49-F238E27FC236}">
+                <a16:creationId xmlns:a16="http://schemas.microsoft.com/office/drawing/2014/main" id="{5E0735EC-6B0B-DDA9-0422-F07CF8264683}"/>
+              </a:ext>
+            </a:extLst>
+          </p:cNvPr>
+          <p:cNvSpPr>
+            <a:spLocks noGrp="1"/>
+          </p:cNvSpPr>
+          <p:nvPr>
+            <p:ph idx="1"/>
+          </p:nvPr>
+        </p:nvSpPr>
+        <p:spPr>
+          <a:xfrm>
+            <a:off x="381740" y="1056444"/>
+            <a:ext cx="11354540" cy="5699464"/>
+          </a:xfrm>
+        </p:spPr>
+        <p:txBody>
+          <a:bodyPr>
+            <a:normAutofit fontScale="47500" lnSpcReduction="20000"/>
+          </a:bodyPr>
+          <a:lstStyle/>
+          <a:p>
+            <a:r>
+              <a:rPr lang="es-419" sz="4400" dirty="0"/>
+              <a:t> Hipótesis u Objetivo General:</a:t>
+            </a:r>
+          </a:p>
+          <a:p>
+            <a:pPr marL="0" indent="0">
+              <a:buNone/>
+            </a:pPr>
+            <a:endParaRPr lang="es-419" sz="4400" dirty="0"/>
+          </a:p>
+          <a:p>
+            <a:pPr marL="0" indent="0" algn="just">
+              <a:buNone/>
+            </a:pPr>
+            <a:r>
+              <a:rPr lang="es-419" sz="4400" i="1" dirty="0"/>
+              <a:t>El autoajuste de un modelo LLM fundacional (</a:t>
+            </a:r>
+            <a:r>
+              <a:rPr lang="es-419" sz="4400" i="1" dirty="0" err="1"/>
+              <a:t>e.d</a:t>
+            </a:r>
+            <a:r>
+              <a:rPr lang="es-419" sz="4400" i="1" dirty="0"/>
+              <a:t> Llama2, Falcon , </a:t>
+            </a:r>
+            <a:r>
+              <a:rPr lang="es-419" sz="4400" i="1" dirty="0" err="1"/>
+              <a:t>BioMistral</a:t>
+            </a:r>
+            <a:r>
+              <a:rPr lang="es-419" sz="4400" i="1" dirty="0"/>
+              <a:t>, </a:t>
+            </a:r>
+            <a:r>
+              <a:rPr lang="es-419" sz="4400" i="1" dirty="0" err="1"/>
+              <a:t>Meditron</a:t>
+            </a:r>
+            <a:r>
+              <a:rPr lang="es-419" sz="4400" i="1" dirty="0"/>
+              <a:t>) con un alto grado o completamente </a:t>
+            </a:r>
+            <a:r>
+              <a:rPr lang="es-419" sz="4400" i="1" dirty="0" err="1"/>
+              <a:t>pre-entrenado</a:t>
+            </a:r>
+            <a:r>
+              <a:rPr lang="es-419" sz="4400" i="1" dirty="0"/>
+              <a:t> con textos en español, para datos de entrenamiento médico dará buenos resultados si:</a:t>
+            </a:r>
+          </a:p>
+          <a:p>
+            <a:pPr marL="0" indent="0" algn="just">
+              <a:buNone/>
+            </a:pPr>
+            <a:endParaRPr lang="es-419" sz="4400" i="1" dirty="0"/>
+          </a:p>
+          <a:p>
+            <a:pPr>
+              <a:buFont typeface="Wingdings" panose="05000000000000000000" pitchFamily="2" charset="2"/>
+              <a:buChar char="ü"/>
+            </a:pPr>
+            <a:r>
+              <a:rPr lang="es-419" sz="3300" dirty="0"/>
+              <a:t> Se usa la técnica de </a:t>
+            </a:r>
+            <a:r>
+              <a:rPr lang="es-419" sz="3300" dirty="0" err="1"/>
+              <a:t>Qlora</a:t>
+            </a:r>
+            <a:r>
+              <a:rPr lang="es-419" sz="3300" dirty="0"/>
+              <a:t> permitirá mantener el desempeño y el costo del modelo (</a:t>
+            </a:r>
+            <a:r>
+              <a:rPr lang="es-419" sz="3300" dirty="0" err="1"/>
+              <a:t>e.d</a:t>
+            </a:r>
+            <a:r>
+              <a:rPr lang="es-419" sz="3300" dirty="0"/>
+              <a:t> memoria, velocidad de respuesta, </a:t>
+            </a:r>
+            <a:r>
+              <a:rPr lang="es-419" sz="3300" dirty="0" err="1"/>
+              <a:t>etc</a:t>
+            </a:r>
+            <a:r>
+              <a:rPr lang="es-419" sz="3300" dirty="0"/>
+              <a:t>)</a:t>
+            </a:r>
+          </a:p>
+          <a:p>
+            <a:pPr>
+              <a:buFont typeface="Wingdings" panose="05000000000000000000" pitchFamily="2" charset="2"/>
+              <a:buChar char="ü"/>
+            </a:pPr>
+            <a:endParaRPr lang="es-419" sz="3300" dirty="0"/>
+          </a:p>
+          <a:p>
+            <a:pPr>
+              <a:buFont typeface="Wingdings" panose="05000000000000000000" pitchFamily="2" charset="2"/>
+              <a:buChar char="ü"/>
+            </a:pPr>
+            <a:r>
+              <a:rPr lang="es-419" sz="3300" dirty="0"/>
+              <a:t>Se usa la estrategia mezclado (</a:t>
+            </a:r>
+            <a:r>
+              <a:rPr lang="es-419" sz="3300" dirty="0" err="1"/>
+              <a:t>mixed</a:t>
+            </a:r>
+            <a:r>
+              <a:rPr lang="es-419" sz="3300" dirty="0"/>
+              <a:t>) de </a:t>
+            </a:r>
+            <a:r>
+              <a:rPr lang="es-419" sz="3300" dirty="0" err="1"/>
+              <a:t>BioMistral</a:t>
+            </a:r>
+            <a:r>
+              <a:rPr lang="es-419" sz="3300" dirty="0"/>
+              <a:t> propuesto en el trabajo “</a:t>
+            </a:r>
+            <a:r>
+              <a:rPr lang="en-US" sz="3300" dirty="0" err="1"/>
+              <a:t>BioMistral</a:t>
+            </a:r>
+            <a:r>
+              <a:rPr lang="en-US" sz="3300" dirty="0"/>
+              <a:t>: A Collection of Open-Source Pretrained Large Language Models for Medical Domains</a:t>
+            </a:r>
+            <a:r>
+              <a:rPr lang="es-419" sz="3300" dirty="0"/>
+              <a:t>” dará mejores resultados en el desempeño del modelo</a:t>
+            </a:r>
+          </a:p>
+          <a:p>
+            <a:pPr>
+              <a:buFont typeface="Wingdings" panose="05000000000000000000" pitchFamily="2" charset="2"/>
+              <a:buChar char="ü"/>
+            </a:pPr>
+            <a:endParaRPr lang="es-419" sz="3300" dirty="0"/>
+          </a:p>
+          <a:p>
+            <a:pPr>
+              <a:buFont typeface="Wingdings" panose="05000000000000000000" pitchFamily="2" charset="2"/>
+              <a:buChar char="ü"/>
+            </a:pPr>
+            <a:r>
+              <a:rPr lang="es-419" sz="3300" dirty="0"/>
+              <a:t>Si se usa la estrategia  de replay (Aprendizaje Continuo) usado en </a:t>
+            </a:r>
+            <a:r>
+              <a:rPr lang="es-419" sz="3300" dirty="0" err="1"/>
+              <a:t>Meditron</a:t>
+            </a:r>
+            <a:r>
+              <a:rPr lang="es-419" sz="3300" dirty="0"/>
+              <a:t> en el trabajo “</a:t>
+            </a:r>
+            <a:r>
+              <a:rPr lang="en-US" sz="3300" dirty="0"/>
+              <a:t>Meditron-70b: Scaling medical pretraining for large language models</a:t>
+            </a:r>
+            <a:r>
+              <a:rPr lang="es-419" sz="3300" dirty="0"/>
+              <a:t>”</a:t>
+            </a:r>
+          </a:p>
+          <a:p>
+            <a:pPr>
+              <a:buFont typeface="Wingdings" panose="05000000000000000000" pitchFamily="2" charset="2"/>
+              <a:buChar char="ü"/>
+            </a:pPr>
+            <a:endParaRPr lang="es-419" sz="3300" dirty="0"/>
+          </a:p>
+          <a:p>
+            <a:pPr>
+              <a:buFont typeface="Wingdings" panose="05000000000000000000" pitchFamily="2" charset="2"/>
+              <a:buChar char="ü"/>
+            </a:pPr>
+            <a:r>
+              <a:rPr lang="es-419" sz="3300" dirty="0"/>
+              <a:t>El uso de estrategia como </a:t>
+            </a:r>
+            <a:r>
+              <a:rPr lang="en-US" sz="3300" b="1" dirty="0"/>
+              <a:t>Direct Preference Optimization (DPO) </a:t>
+            </a:r>
+            <a:r>
+              <a:rPr lang="en-US" sz="3300" dirty="0" err="1"/>
+              <a:t>permite</a:t>
+            </a:r>
+            <a:r>
+              <a:rPr lang="en-US" sz="3300" dirty="0"/>
+              <a:t> </a:t>
+            </a:r>
+            <a:r>
+              <a:rPr lang="en-US" sz="3300" dirty="0" err="1"/>
+              <a:t>mejorar</a:t>
+            </a:r>
+            <a:r>
+              <a:rPr lang="en-US" sz="3300" dirty="0"/>
+              <a:t> </a:t>
+            </a:r>
+            <a:r>
+              <a:rPr lang="en-US" sz="3300" dirty="0" err="1"/>
+              <a:t>el</a:t>
+            </a:r>
+            <a:r>
+              <a:rPr lang="en-US" sz="3300" dirty="0"/>
+              <a:t> </a:t>
+            </a:r>
+            <a:r>
+              <a:rPr lang="en-US" sz="3300" dirty="0" err="1"/>
+              <a:t>desempeño</a:t>
+            </a:r>
+            <a:r>
+              <a:rPr lang="en-US" sz="3300" dirty="0"/>
+              <a:t> sin usar RLHF</a:t>
+            </a:r>
+          </a:p>
+          <a:p>
+            <a:pPr>
+              <a:buFont typeface="Wingdings" panose="05000000000000000000" pitchFamily="2" charset="2"/>
+              <a:buChar char="ü"/>
+            </a:pPr>
+            <a:endParaRPr lang="es-419" sz="3300" dirty="0"/>
+          </a:p>
+          <a:p>
+            <a:pPr>
+              <a:buFont typeface="Wingdings" panose="05000000000000000000" pitchFamily="2" charset="2"/>
+              <a:buChar char="ü"/>
+            </a:pPr>
+            <a:r>
+              <a:rPr lang="es-419" sz="3300" dirty="0"/>
+              <a:t>El uso en al autoajuste de fuentes de medicina tradicional y natural permitirá generar resultados o soluciones a problemas médicos más accesibles a los usuarios</a:t>
+            </a:r>
+          </a:p>
+          <a:p>
+            <a:pPr lvl="1">
+              <a:buFont typeface="Courier New" panose="02070309020205020404" pitchFamily="49" charset="0"/>
+              <a:buChar char="o"/>
+            </a:pPr>
+            <a:r>
+              <a:rPr lang="es-419" sz="3300" dirty="0"/>
+              <a:t>Puede obtenerse con una estrategia </a:t>
+            </a:r>
+            <a:r>
+              <a:rPr lang="en-US" sz="3300" dirty="0"/>
+              <a:t>Retrieval Augmented Generation (RAG)</a:t>
+            </a:r>
+          </a:p>
+        </p:txBody>
+      </p:sp>
+    </p:spTree>
+    <p:extLst>
+      <p:ext uri="{BB962C8B-B14F-4D97-AF65-F5344CB8AC3E}">
+        <p14:creationId xmlns:p14="http://schemas.microsoft.com/office/powerpoint/2010/main" val="144997341"/>
+      </p:ext>
+    </p:extLst>
+  </p:cSld>
+  <p:clrMapOvr>
+    <a:masterClrMapping/>
+  </p:clrMapOvr>
+</p:sld>
+</file>
+
+<file path=ppt/slides/slide8.xml><?xml version="1.0" encoding="utf-8"?>
+<p:sld xmlns:a="http://schemas.openxmlformats.org/drawingml/2006/main" xmlns:r="http://schemas.openxmlformats.org/officeDocument/2006/relationships" xmlns:p="http://schemas.openxmlformats.org/presentationml/2006/main">
+  <p:cSld>
+    <p:spTree>
+      <p:nvGrpSpPr>
+        <p:cNvPr id="1" name=""/>
+        <p:cNvGrpSpPr/>
+        <p:nvPr/>
+      </p:nvGrpSpPr>
+      <p:grpSpPr>
+        <a:xfrm>
+          <a:off x="0" y="0"/>
+          <a:ext cx="0" cy="0"/>
+          <a:chOff x="0" y="0"/>
+          <a:chExt cx="0" cy="0"/>
+        </a:xfrm>
+      </p:grpSpPr>
+      <p:sp>
+        <p:nvSpPr>
+          <p:cNvPr id="2" name="Título 1">
+            <a:extLst>
+              <a:ext uri="{FF2B5EF4-FFF2-40B4-BE49-F238E27FC236}">
                 <a16:creationId xmlns:a16="http://schemas.microsoft.com/office/drawing/2014/main" id="{E3C4A946-4591-E2B8-B38D-B24599DC6CEE}"/>
               </a:ext>
             </a:extLst>
@@ -5755,7 +8488,7 @@
 </p:sld>
 </file>
 
-<file path=ppt/slides/slide8.xml><?xml version="1.0" encoding="utf-8"?>
+<file path=ppt/slides/slide9.xml><?xml version="1.0" encoding="utf-8"?>
 <p:sld xmlns:a="http://schemas.openxmlformats.org/drawingml/2006/main" xmlns:r="http://schemas.openxmlformats.org/officeDocument/2006/relationships" xmlns:p="http://schemas.openxmlformats.org/presentationml/2006/main">
   <p:cSld>
     <p:spTree>
@@ -8020,90 +10753,6 @@
     <p:extLst>
       <p:ext uri="{BB962C8B-B14F-4D97-AF65-F5344CB8AC3E}">
         <p14:creationId xmlns:p14="http://schemas.microsoft.com/office/powerpoint/2010/main" val="2304020135"/>
-      </p:ext>
-    </p:extLst>
-  </p:cSld>
-  <p:clrMapOvr>
-    <a:masterClrMapping/>
-  </p:clrMapOvr>
-</p:sld>
-</file>
-
-<file path=ppt/slides/slide9.xml><?xml version="1.0" encoding="utf-8"?>
-<p:sld xmlns:a="http://schemas.openxmlformats.org/drawingml/2006/main" xmlns:r="http://schemas.openxmlformats.org/officeDocument/2006/relationships" xmlns:p="http://schemas.openxmlformats.org/presentationml/2006/main">
-  <p:cSld>
-    <p:spTree>
-      <p:nvGrpSpPr>
-        <p:cNvPr id="1" name=""/>
-        <p:cNvGrpSpPr/>
-        <p:nvPr/>
-      </p:nvGrpSpPr>
-      <p:grpSpPr>
-        <a:xfrm>
-          <a:off x="0" y="0"/>
-          <a:ext cx="0" cy="0"/>
-          <a:chOff x="0" y="0"/>
-          <a:chExt cx="0" cy="0"/>
-        </a:xfrm>
-      </p:grpSpPr>
-      <p:sp>
-        <p:nvSpPr>
-          <p:cNvPr id="2" name="Título 1">
-            <a:extLst>
-              <a:ext uri="{FF2B5EF4-FFF2-40B4-BE49-F238E27FC236}">
-                <a16:creationId xmlns:a16="http://schemas.microsoft.com/office/drawing/2014/main" id="{316D1FB3-7BCD-44A2-2946-99BA1BF3C80C}"/>
-              </a:ext>
-            </a:extLst>
-          </p:cNvPr>
-          <p:cNvSpPr>
-            <a:spLocks noGrp="1"/>
-          </p:cNvSpPr>
-          <p:nvPr>
-            <p:ph type="title"/>
-          </p:nvPr>
-        </p:nvSpPr>
-        <p:spPr/>
-        <p:txBody>
-          <a:bodyPr/>
-          <a:lstStyle/>
-          <a:p>
-            <a:r>
-              <a:rPr lang="es-419" dirty="0"/>
-              <a:t>Estructura del entrenador</a:t>
-            </a:r>
-            <a:endParaRPr lang="en-US" dirty="0"/>
-          </a:p>
-        </p:txBody>
-      </p:sp>
-      <p:sp>
-        <p:nvSpPr>
-          <p:cNvPr id="3" name="Marcador de contenido 2">
-            <a:extLst>
-              <a:ext uri="{FF2B5EF4-FFF2-40B4-BE49-F238E27FC236}">
-                <a16:creationId xmlns:a16="http://schemas.microsoft.com/office/drawing/2014/main" id="{F2D2B6B5-311E-BF90-A82E-DD1C1183A794}"/>
-              </a:ext>
-            </a:extLst>
-          </p:cNvPr>
-          <p:cNvSpPr>
-            <a:spLocks noGrp="1"/>
-          </p:cNvSpPr>
-          <p:nvPr>
-            <p:ph idx="1"/>
-          </p:nvPr>
-        </p:nvSpPr>
-        <p:spPr/>
-        <p:txBody>
-          <a:bodyPr/>
-          <a:lstStyle/>
-          <a:p>
-            <a:endParaRPr lang="en-US"/>
-          </a:p>
-        </p:txBody>
-      </p:sp>
-    </p:spTree>
-    <p:extLst>
-      <p:ext uri="{BB962C8B-B14F-4D97-AF65-F5344CB8AC3E}">
-        <p14:creationId xmlns:p14="http://schemas.microsoft.com/office/powerpoint/2010/main" val="3683717391"/>
       </p:ext>
     </p:extLst>
   </p:cSld>

</xml_diff>